<commit_message>
Adding diagrams to presentation Powerpoint deck
</commit_message>
<xml_diff>
--- a/submissions/final/cog_therapy.pptx
+++ b/submissions/final/cog_therapy.pptx
@@ -5,18 +5,20 @@
     <p:sldMasterId id="2147483703" r:id="rId1"/>
   </p:sldMasterIdLst>
   <p:notesMasterIdLst>
-    <p:notesMasterId r:id="rId8"/>
+    <p:notesMasterId r:id="rId10"/>
   </p:notesMasterIdLst>
   <p:handoutMasterIdLst>
-    <p:handoutMasterId r:id="rId9"/>
+    <p:handoutMasterId r:id="rId11"/>
   </p:handoutMasterIdLst>
   <p:sldIdLst>
     <p:sldId id="259" r:id="rId2"/>
     <p:sldId id="260" r:id="rId3"/>
     <p:sldId id="261" r:id="rId4"/>
-    <p:sldId id="262" r:id="rId5"/>
-    <p:sldId id="263" r:id="rId6"/>
-    <p:sldId id="264" r:id="rId7"/>
+    <p:sldId id="265" r:id="rId5"/>
+    <p:sldId id="266" r:id="rId6"/>
+    <p:sldId id="262" r:id="rId7"/>
+    <p:sldId id="263" r:id="rId8"/>
+    <p:sldId id="264" r:id="rId9"/>
   </p:sldIdLst>
   <p:sldSz cx="9144000" cy="5143500" type="screen16x9"/>
   <p:notesSz cx="6858000" cy="9144000"/>
@@ -123,6 +125,8 @@
             <p14:sldId id="259"/>
             <p14:sldId id="260"/>
             <p14:sldId id="261"/>
+            <p14:sldId id="265"/>
+            <p14:sldId id="266"/>
             <p14:sldId id="262"/>
             <p14:sldId id="263"/>
             <p14:sldId id="264"/>
@@ -245,7 +249,7 @@
             <a:fld id="{D83FDC75-7F73-4A4A-A77C-09AADF00E0EA}" type="datetimeFigureOut">
               <a:rPr lang="en-US" smtClean="0"/>
               <a:pPr/>
-              <a:t>5/5/2022</a:t>
+              <a:t>5/6/2022</a:t>
             </a:fld>
             <a:endParaRPr lang="en-US" dirty="0"/>
           </a:p>
@@ -412,7 +416,7 @@
             <a:fld id="{48AEF76B-3757-4A0B-AF93-28494465C1DD}" type="datetimeFigureOut">
               <a:rPr lang="en-US" smtClean="0"/>
               <a:pPr/>
-              <a:t>5/5/2022</a:t>
+              <a:t>5/6/2022</a:t>
             </a:fld>
             <a:endParaRPr lang="en-US" dirty="0"/>
           </a:p>
@@ -926,7 +930,7 @@
             <a:fld id="{75693FD4-8F83-4EF7-AC3F-0DC0388986B0}" type="slidenum">
               <a:rPr lang="en-US" smtClean="0"/>
               <a:pPr/>
-              <a:t>4</a:t>
+              <a:t>6</a:t>
             </a:fld>
             <a:endParaRPr lang="en-US" dirty="0"/>
           </a:p>
@@ -1035,7 +1039,7 @@
             <a:fld id="{75693FD4-8F83-4EF7-AC3F-0DC0388986B0}" type="slidenum">
               <a:rPr lang="en-US" smtClean="0"/>
               <a:pPr/>
-              <a:t>5</a:t>
+              <a:t>7</a:t>
             </a:fld>
             <a:endParaRPr lang="en-US" dirty="0"/>
           </a:p>
@@ -1132,7 +1136,7 @@
             <a:fld id="{75693FD4-8F83-4EF7-AC3F-0DC0388986B0}" type="slidenum">
               <a:rPr lang="en-US" smtClean="0"/>
               <a:pPr/>
-              <a:t>6</a:t>
+              <a:t>8</a:t>
             </a:fld>
             <a:endParaRPr lang="en-US" dirty="0"/>
           </a:p>
@@ -1378,7 +1382,7 @@
             <a:fld id="{757B281C-5159-4971-8228-52B9A72E9ED2}" type="datetimeFigureOut">
               <a:rPr lang="en-US" smtClean="0"/>
               <a:pPr/>
-              <a:t>5/5/2022</a:t>
+              <a:t>5/6/2022</a:t>
             </a:fld>
             <a:endParaRPr lang="en-US" dirty="0"/>
           </a:p>
@@ -1588,7 +1592,7 @@
             <a:fld id="{757B281C-5159-4971-8228-52B9A72E9ED2}" type="datetimeFigureOut">
               <a:rPr lang="en-US" smtClean="0"/>
               <a:pPr/>
-              <a:t>5/5/2022</a:t>
+              <a:t>5/6/2022</a:t>
             </a:fld>
             <a:endParaRPr lang="en-US" dirty="0"/>
           </a:p>
@@ -1849,7 +1853,7 @@
             <a:fld id="{757B281C-5159-4971-8228-52B9A72E9ED2}" type="datetimeFigureOut">
               <a:rPr lang="en-US" smtClean="0"/>
               <a:pPr/>
-              <a:t>5/5/2022</a:t>
+              <a:t>5/6/2022</a:t>
             </a:fld>
             <a:endParaRPr lang="en-US" dirty="0"/>
           </a:p>
@@ -2455,7 +2459,7 @@
             <a:fld id="{757B281C-5159-4971-8228-52B9A72E9ED2}" type="datetimeFigureOut">
               <a:rPr lang="en-US" smtClean="0"/>
               <a:pPr/>
-              <a:t>5/5/2022</a:t>
+              <a:t>5/6/2022</a:t>
             </a:fld>
             <a:endParaRPr lang="en-US" dirty="0"/>
           </a:p>
@@ -2852,7 +2856,7 @@
             <a:fld id="{757B281C-5159-4971-8228-52B9A72E9ED2}" type="datetimeFigureOut">
               <a:rPr lang="en-US" smtClean="0"/>
               <a:pPr/>
-              <a:t>5/5/2022</a:t>
+              <a:t>5/6/2022</a:t>
             </a:fld>
             <a:endParaRPr lang="en-US" dirty="0"/>
           </a:p>
@@ -2986,7 +2990,7 @@
             <a:fld id="{757B281C-5159-4971-8228-52B9A72E9ED2}" type="datetimeFigureOut">
               <a:rPr lang="en-US" smtClean="0"/>
               <a:pPr/>
-              <a:t>5/5/2022</a:t>
+              <a:t>5/6/2022</a:t>
             </a:fld>
             <a:endParaRPr lang="en-US" dirty="0"/>
           </a:p>
@@ -3166,7 +3170,7 @@
             <a:fld id="{757B281C-5159-4971-8228-52B9A72E9ED2}" type="datetimeFigureOut">
               <a:rPr lang="en-US" smtClean="0"/>
               <a:pPr/>
-              <a:t>5/5/2022</a:t>
+              <a:t>5/6/2022</a:t>
             </a:fld>
             <a:endParaRPr lang="en-US" dirty="0"/>
           </a:p>
@@ -3514,7 +3518,7 @@
             <a:fld id="{757B281C-5159-4971-8228-52B9A72E9ED2}" type="datetimeFigureOut">
               <a:rPr lang="en-US" smtClean="0"/>
               <a:pPr/>
-              <a:t>5/5/2022</a:t>
+              <a:t>5/6/2022</a:t>
             </a:fld>
             <a:endParaRPr lang="en-US" dirty="0"/>
           </a:p>
@@ -3791,7 +3795,7 @@
             <a:fld id="{757B281C-5159-4971-8228-52B9A72E9ED2}" type="datetimeFigureOut">
               <a:rPr lang="en-US" smtClean="0"/>
               <a:pPr/>
-              <a:t>5/5/2022</a:t>
+              <a:t>5/6/2022</a:t>
             </a:fld>
             <a:endParaRPr lang="en-US" dirty="0"/>
           </a:p>
@@ -4175,7 +4179,7 @@
             <a:fld id="{757B281C-5159-4971-8228-52B9A72E9ED2}" type="datetimeFigureOut">
               <a:rPr lang="en-US" smtClean="0"/>
               <a:pPr/>
-              <a:t>5/5/2022</a:t>
+              <a:t>5/6/2022</a:t>
             </a:fld>
             <a:endParaRPr lang="en-US" dirty="0"/>
           </a:p>
@@ -4298,7 +4302,7 @@
             <a:fld id="{757B281C-5159-4971-8228-52B9A72E9ED2}" type="datetimeFigureOut">
               <a:rPr lang="en-US" smtClean="0"/>
               <a:pPr/>
-              <a:t>5/5/2022</a:t>
+              <a:t>5/6/2022</a:t>
             </a:fld>
             <a:endParaRPr lang="en-US" dirty="0"/>
           </a:p>
@@ -4474,7 +4478,7 @@
             <a:fld id="{757B281C-5159-4971-8228-52B9A72E9ED2}" type="datetimeFigureOut">
               <a:rPr lang="en-US" smtClean="0"/>
               <a:pPr/>
-              <a:t>5/5/2022</a:t>
+              <a:t>5/6/2022</a:t>
             </a:fld>
             <a:endParaRPr lang="en-US" dirty="0"/>
           </a:p>
@@ -4833,7 +4837,7 @@
             <a:fld id="{757B281C-5159-4971-8228-52B9A72E9ED2}" type="datetimeFigureOut">
               <a:rPr lang="en-US" smtClean="0"/>
               <a:pPr/>
-              <a:t>5/5/2022</a:t>
+              <a:t>5/6/2022</a:t>
             </a:fld>
             <a:endParaRPr lang="en-US" dirty="0"/>
           </a:p>
@@ -5215,7 +5219,7 @@
             <a:fld id="{757B281C-5159-4971-8228-52B9A72E9ED2}" type="datetimeFigureOut">
               <a:rPr lang="en-US" smtClean="0"/>
               <a:pPr/>
-              <a:t>5/5/2022</a:t>
+              <a:t>5/6/2022</a:t>
             </a:fld>
             <a:endParaRPr lang="en-US" dirty="0"/>
           </a:p>
@@ -5507,7 +5511,7 @@
             <a:fld id="{757B281C-5159-4971-8228-52B9A72E9ED2}" type="datetimeFigureOut">
               <a:rPr lang="en-US" smtClean="0"/>
               <a:pPr/>
-              <a:t>5/5/2022</a:t>
+              <a:t>5/6/2022</a:t>
             </a:fld>
             <a:endParaRPr lang="en-US" dirty="0"/>
           </a:p>
@@ -6287,8 +6291,8 @@
         </p:nvSpPr>
         <p:spPr>
           <a:xfrm>
-            <a:off x="723900" y="482600"/>
-            <a:ext cx="4691270" cy="3790506"/>
+            <a:off x="723900" y="819150"/>
+            <a:ext cx="4691270" cy="3124200"/>
           </a:xfrm>
         </p:spPr>
         <p:txBody>
@@ -6348,8 +6352,8 @@
         </p:nvSpPr>
         <p:spPr>
           <a:xfrm>
-            <a:off x="5903246" y="482600"/>
-            <a:ext cx="2506116" cy="3790506"/>
+            <a:off x="5903246" y="971550"/>
+            <a:ext cx="2506116" cy="2828192"/>
           </a:xfrm>
         </p:spPr>
         <p:txBody>
@@ -6411,7 +6415,7 @@
                 </a:solidFill>
                 <a:latin typeface="+mj-lt"/>
               </a:rPr>
-              <a:t>5/2/2022</a:t>
+              <a:t>5/6/2022</a:t>
             </a:r>
           </a:p>
         </p:txBody>
@@ -6577,6 +6581,64 @@
             <a:schemeClr val="lt1"/>
           </a:fontRef>
         </p:style>
+      </p:sp>
+      <p:sp>
+        <p:nvSpPr>
+          <p:cNvPr id="4" name="TextBox 3">
+            <a:extLst>
+              <a:ext uri="{FF2B5EF4-FFF2-40B4-BE49-F238E27FC236}">
+                <a16:creationId xmlns:a16="http://schemas.microsoft.com/office/drawing/2014/main" id="{156765A1-2701-63F7-9A48-CF0DE4D0FDEB}"/>
+              </a:ext>
+            </a:extLst>
+          </p:cNvPr>
+          <p:cNvSpPr txBox="1"/>
+          <p:nvPr/>
+        </p:nvSpPr>
+        <p:spPr>
+          <a:xfrm>
+            <a:off x="905743" y="3977711"/>
+            <a:ext cx="7095257" cy="738664"/>
+          </a:xfrm>
+          <a:prstGeom prst="rect">
+            <a:avLst/>
+          </a:prstGeom>
+          <a:noFill/>
+        </p:spPr>
+        <p:txBody>
+          <a:bodyPr wrap="square" rtlCol="0">
+            <a:spAutoFit/>
+          </a:bodyPr>
+          <a:lstStyle/>
+          <a:p>
+            <a:r>
+              <a:rPr lang="en-US" sz="1400" dirty="0"/>
+              <a:t>Franziska Burger, Mark A. </a:t>
+            </a:r>
+            <a:r>
+              <a:rPr lang="en-US" sz="1400" dirty="0" err="1"/>
+              <a:t>Neerincx</a:t>
+            </a:r>
+            <a:r>
+              <a:rPr lang="en-US" sz="1400" dirty="0"/>
+              <a:t>, and Willem-Paul Brinkman. 2021.</a:t>
+            </a:r>
+          </a:p>
+          <a:p>
+            <a:r>
+              <a:rPr lang="en-US" sz="1400" dirty="0">
+                <a:hlinkClick r:id="rId6"/>
+              </a:rPr>
+              <a:t>Natural language processing for cognitive therapy: Extracting schemas from thought records.</a:t>
+            </a:r>
+            <a:endParaRPr lang="en-US" sz="1400" dirty="0"/>
+          </a:p>
+          <a:p>
+            <a:r>
+              <a:rPr lang="en-US" sz="1400" dirty="0"/>
+              <a:t>PLOS ONE, 16(10).</a:t>
+            </a:r>
+          </a:p>
+        </p:txBody>
       </p:sp>
     </p:spTree>
     <p:custDataLst>
@@ -6843,100 +6905,775 @@
       </p:grpSpPr>
       <p:sp>
         <p:nvSpPr>
-          <p:cNvPr id="2" name="Title 1"/>
-          <p:cNvSpPr>
-            <a:spLocks noGrp="1"/>
-          </p:cNvSpPr>
-          <p:nvPr>
-            <p:ph type="title"/>
-          </p:nvPr>
-        </p:nvSpPr>
-        <p:spPr/>
+          <p:cNvPr id="2" name="Title 1">
+            <a:extLst>
+              <a:ext uri="{FF2B5EF4-FFF2-40B4-BE49-F238E27FC236}">
+                <a16:creationId xmlns:a16="http://schemas.microsoft.com/office/drawing/2014/main" id="{389411C4-C78F-27B6-05D0-871EEF60F719}"/>
+              </a:ext>
+            </a:extLst>
+          </p:cNvPr>
+          <p:cNvSpPr txBox="1">
+            <a:spLocks/>
+          </p:cNvSpPr>
+          <p:nvPr/>
+        </p:nvSpPr>
+        <p:spPr>
+          <a:xfrm>
+            <a:off x="822960" y="214953"/>
+            <a:ext cx="7543800" cy="527997"/>
+          </a:xfrm>
+          <a:prstGeom prst="rect">
+            <a:avLst/>
+          </a:prstGeom>
+        </p:spPr>
         <p:txBody>
           <a:bodyPr/>
-          <a:lstStyle/>
+          <a:lstStyle>
+            <a:lvl1pPr algn="l" defTabSz="685800" rtl="0" eaLnBrk="1" latinLnBrk="0" hangingPunct="1">
+              <a:lnSpc>
+                <a:spcPct val="85000"/>
+              </a:lnSpc>
+              <a:spcBef>
+                <a:spcPct val="0"/>
+              </a:spcBef>
+              <a:buNone/>
+              <a:defRPr sz="3600" kern="1200" spc="-38" baseline="0">
+                <a:solidFill>
+                  <a:schemeClr val="tx1">
+                    <a:lumMod val="75000"/>
+                    <a:lumOff val="25000"/>
+                  </a:schemeClr>
+                </a:solidFill>
+                <a:latin typeface="+mj-lt"/>
+                <a:ea typeface="+mj-ea"/>
+                <a:cs typeface="+mj-cs"/>
+              </a:defRPr>
+            </a:lvl1pPr>
+          </a:lstStyle>
           <a:p>
             <a:r>
               <a:rPr lang="en-US" dirty="0"/>
-              <a:t>Scope of Reproducibility </a:t>
-            </a:r>
-          </a:p>
-        </p:txBody>
-      </p:sp>
-      <p:sp>
-        <p:nvSpPr>
-          <p:cNvPr id="3" name="Content Placeholder 2"/>
-          <p:cNvSpPr>
-            <a:spLocks noGrp="1"/>
-          </p:cNvSpPr>
-          <p:nvPr>
-            <p:ph idx="1"/>
-          </p:nvPr>
-        </p:nvSpPr>
-        <p:spPr>
-          <a:xfrm>
-            <a:off x="822960" y="1428750"/>
-            <a:ext cx="8077200" cy="3352800"/>
-          </a:xfrm>
-        </p:spPr>
-        <p:txBody>
-          <a:bodyPr>
-            <a:normAutofit/>
+              <a:t>Experimental Setup</a:t>
+            </a:r>
+          </a:p>
+        </p:txBody>
+      </p:sp>
+      <p:cxnSp>
+        <p:nvCxnSpPr>
+          <p:cNvPr id="4" name="Straight Connector 3">
+            <a:extLst>
+              <a:ext uri="{FF2B5EF4-FFF2-40B4-BE49-F238E27FC236}">
+                <a16:creationId xmlns:a16="http://schemas.microsoft.com/office/drawing/2014/main" id="{7F076B9D-8F67-0FA3-1F17-90578805F690}"/>
+              </a:ext>
+            </a:extLst>
+          </p:cNvPr>
+          <p:cNvCxnSpPr/>
+          <p:nvPr/>
+        </p:nvCxnSpPr>
+        <p:spPr>
+          <a:xfrm>
+            <a:off x="838200" y="819150"/>
+            <a:ext cx="7543800" cy="0"/>
+          </a:xfrm>
+          <a:prstGeom prst="line">
+            <a:avLst/>
+          </a:prstGeom>
+          <a:ln>
+            <a:solidFill>
+              <a:schemeClr val="bg1">
+                <a:lumMod val="75000"/>
+              </a:schemeClr>
+            </a:solidFill>
+          </a:ln>
+        </p:spPr>
+        <p:style>
+          <a:lnRef idx="1">
+            <a:schemeClr val="dk1"/>
+          </a:lnRef>
+          <a:fillRef idx="0">
+            <a:schemeClr val="dk1"/>
+          </a:fillRef>
+          <a:effectRef idx="0">
+            <a:schemeClr val="dk1"/>
+          </a:effectRef>
+          <a:fontRef idx="minor">
+            <a:schemeClr val="tx1"/>
+          </a:fontRef>
+        </p:style>
+      </p:cxnSp>
+      <p:sp>
+        <p:nvSpPr>
+          <p:cNvPr id="5" name="TextBox 4">
+            <a:extLst>
+              <a:ext uri="{FF2B5EF4-FFF2-40B4-BE49-F238E27FC236}">
+                <a16:creationId xmlns:a16="http://schemas.microsoft.com/office/drawing/2014/main" id="{CE341447-4288-B8B9-E0C0-5C8E8DF62E24}"/>
+              </a:ext>
+            </a:extLst>
+          </p:cNvPr>
+          <p:cNvSpPr txBox="1"/>
+          <p:nvPr/>
+        </p:nvSpPr>
+        <p:spPr>
+          <a:xfrm>
+            <a:off x="685800" y="971550"/>
+            <a:ext cx="1066800" cy="369332"/>
+          </a:xfrm>
+          <a:prstGeom prst="rect">
+            <a:avLst/>
+          </a:prstGeom>
+          <a:noFill/>
+        </p:spPr>
+        <p:txBody>
+          <a:bodyPr wrap="square" rtlCol="0">
+            <a:spAutoFit/>
           </a:bodyPr>
           <a:lstStyle/>
           <a:p>
             <a:r>
-              <a:rPr lang="en-US" dirty="0"/>
-              <a:t>Burger et all trained 4 types of model </a:t>
-            </a:r>
-          </a:p>
-          <a:p>
-            <a:r>
-              <a:rPr lang="en-US" dirty="0"/>
-              <a:t>Attempt to recreate these</a:t>
-            </a:r>
-          </a:p>
-          <a:p>
-            <a:r>
-              <a:rPr lang="en-US" dirty="0"/>
-              <a:t>Use different python packages</a:t>
-            </a:r>
-          </a:p>
-          <a:p>
-            <a:r>
-              <a:rPr lang="en-US" dirty="0"/>
-              <a:t>Use different design choices with judgement</a:t>
-            </a:r>
-          </a:p>
-          <a:p>
-            <a:r>
-              <a:rPr lang="en-US" dirty="0"/>
-              <a:t>Test two additional hypothesis </a:t>
-            </a:r>
-          </a:p>
-          <a:p>
-            <a:pPr lvl="1"/>
-            <a:r>
-              <a:rPr lang="en-US" dirty="0"/>
-              <a:t>Lax preprocessing</a:t>
-            </a:r>
-          </a:p>
-          <a:p>
-            <a:pPr lvl="1"/>
-            <a:r>
-              <a:rPr lang="en-US" dirty="0"/>
-              <a:t>Scenario level utterances </a:t>
-            </a:r>
-          </a:p>
-          <a:p>
-            <a:endParaRPr lang="en-US" dirty="0"/>
+              <a:rPr lang="en-US" u="sng" dirty="0"/>
+              <a:t>Scenario</a:t>
+            </a:r>
+          </a:p>
+        </p:txBody>
+      </p:sp>
+      <p:sp>
+        <p:nvSpPr>
+          <p:cNvPr id="6" name="TextBox 5">
+            <a:extLst>
+              <a:ext uri="{FF2B5EF4-FFF2-40B4-BE49-F238E27FC236}">
+                <a16:creationId xmlns:a16="http://schemas.microsoft.com/office/drawing/2014/main" id="{90AA24FA-B610-10A5-CB83-57FD3B4D9703}"/>
+              </a:ext>
+            </a:extLst>
+          </p:cNvPr>
+          <p:cNvSpPr txBox="1"/>
+          <p:nvPr/>
+        </p:nvSpPr>
+        <p:spPr>
+          <a:xfrm>
+            <a:off x="685800" y="1454835"/>
+            <a:ext cx="1524000" cy="954107"/>
+          </a:xfrm>
+          <a:prstGeom prst="rect">
+            <a:avLst/>
+          </a:prstGeom>
+          <a:noFill/>
+        </p:spPr>
+        <p:txBody>
+          <a:bodyPr wrap="square" rtlCol="0">
+            <a:spAutoFit/>
+          </a:bodyPr>
+          <a:lstStyle/>
+          <a:p>
+            <a:r>
+              <a:rPr lang="en-US" sz="1400" dirty="0"/>
+              <a:t>“You’ve been dieting for a week, but you gained a pound.”</a:t>
+            </a:r>
+          </a:p>
+        </p:txBody>
+      </p:sp>
+      <p:sp>
+        <p:nvSpPr>
+          <p:cNvPr id="7" name="TextBox 6">
+            <a:extLst>
+              <a:ext uri="{FF2B5EF4-FFF2-40B4-BE49-F238E27FC236}">
+                <a16:creationId xmlns:a16="http://schemas.microsoft.com/office/drawing/2014/main" id="{618F6FC6-4FFB-F63B-D71B-065527D3728C}"/>
+              </a:ext>
+            </a:extLst>
+          </p:cNvPr>
+          <p:cNvSpPr txBox="1"/>
+          <p:nvPr/>
+        </p:nvSpPr>
+        <p:spPr>
+          <a:xfrm>
+            <a:off x="2743200" y="971550"/>
+            <a:ext cx="1981200" cy="369332"/>
+          </a:xfrm>
+          <a:prstGeom prst="rect">
+            <a:avLst/>
+          </a:prstGeom>
+          <a:noFill/>
+        </p:spPr>
+        <p:txBody>
+          <a:bodyPr wrap="square" rtlCol="0">
+            <a:spAutoFit/>
+          </a:bodyPr>
+          <a:lstStyle/>
+          <a:p>
+            <a:r>
+              <a:rPr lang="en-US" u="sng" dirty="0"/>
+              <a:t>Automatic Thought</a:t>
+            </a:r>
+          </a:p>
+        </p:txBody>
+      </p:sp>
+      <p:sp>
+        <p:nvSpPr>
+          <p:cNvPr id="8" name="TextBox 7">
+            <a:extLst>
+              <a:ext uri="{FF2B5EF4-FFF2-40B4-BE49-F238E27FC236}">
+                <a16:creationId xmlns:a16="http://schemas.microsoft.com/office/drawing/2014/main" id="{73BB7C3D-139C-1CFA-2B93-77DAAB3DA863}"/>
+              </a:ext>
+            </a:extLst>
+          </p:cNvPr>
+          <p:cNvSpPr txBox="1"/>
+          <p:nvPr/>
+        </p:nvSpPr>
+        <p:spPr>
+          <a:xfrm>
+            <a:off x="6858000" y="971550"/>
+            <a:ext cx="1219200" cy="369332"/>
+          </a:xfrm>
+          <a:prstGeom prst="rect">
+            <a:avLst/>
+          </a:prstGeom>
+          <a:noFill/>
+        </p:spPr>
+        <p:txBody>
+          <a:bodyPr wrap="square" rtlCol="0">
+            <a:spAutoFit/>
+          </a:bodyPr>
+          <a:lstStyle/>
+          <a:p>
+            <a:r>
+              <a:rPr lang="en-US" u="sng" dirty="0"/>
+              <a:t>Schema</a:t>
+            </a:r>
+          </a:p>
+        </p:txBody>
+      </p:sp>
+      <p:pic>
+        <p:nvPicPr>
+          <p:cNvPr id="14" name="Picture 13" descr="A picture containing clipart&#10;&#10;Description automatically generated">
+            <a:extLst>
+              <a:ext uri="{FF2B5EF4-FFF2-40B4-BE49-F238E27FC236}">
+                <a16:creationId xmlns:a16="http://schemas.microsoft.com/office/drawing/2014/main" id="{A573763A-CF4A-2669-E3F3-C45FD8B10554}"/>
+              </a:ext>
+            </a:extLst>
+          </p:cNvPr>
+          <p:cNvPicPr>
+            <a:picLocks noChangeAspect="1"/>
+          </p:cNvPicPr>
+          <p:nvPr/>
+        </p:nvPicPr>
+        <p:blipFill>
+          <a:blip r:embed="rId2" cstate="email">
+            <a:extLst>
+              <a:ext uri="{28A0092B-C50C-407E-A947-70E740481C1C}">
+                <a14:useLocalDpi xmlns:a14="http://schemas.microsoft.com/office/drawing/2010/main" val="0"/>
+              </a:ext>
+            </a:extLst>
+          </a:blip>
+          <a:stretch>
+            <a:fillRect/>
+          </a:stretch>
+        </p:blipFill>
+        <p:spPr>
+          <a:xfrm>
+            <a:off x="1973468" y="2021683"/>
+            <a:ext cx="2141332" cy="2676665"/>
+          </a:xfrm>
+          <a:prstGeom prst="rect">
+            <a:avLst/>
+          </a:prstGeom>
+        </p:spPr>
+      </p:pic>
+      <p:grpSp>
+        <p:nvGrpSpPr>
+          <p:cNvPr id="12" name="Group 11">
+            <a:extLst>
+              <a:ext uri="{FF2B5EF4-FFF2-40B4-BE49-F238E27FC236}">
+                <a16:creationId xmlns:a16="http://schemas.microsoft.com/office/drawing/2014/main" id="{C79B9140-102C-293F-F4B0-908D5D2F8FD4}"/>
+              </a:ext>
+            </a:extLst>
+          </p:cNvPr>
+          <p:cNvGrpSpPr/>
+          <p:nvPr/>
+        </p:nvGrpSpPr>
+        <p:grpSpPr>
+          <a:xfrm>
+            <a:off x="3810000" y="1461425"/>
+            <a:ext cx="1509729" cy="1307578"/>
+            <a:chOff x="3960163" y="1340883"/>
+            <a:chExt cx="1373837" cy="1167761"/>
+          </a:xfrm>
+        </p:grpSpPr>
+        <p:pic>
+          <p:nvPicPr>
+            <p:cNvPr id="10" name="Picture 9" descr="Icon&#10;&#10;Description automatically generated">
+              <a:extLst>
+                <a:ext uri="{FF2B5EF4-FFF2-40B4-BE49-F238E27FC236}">
+                  <a16:creationId xmlns:a16="http://schemas.microsoft.com/office/drawing/2014/main" id="{6EB922AB-180F-E2B8-9582-F86C637B1685}"/>
+                </a:ext>
+              </a:extLst>
+            </p:cNvPr>
+            <p:cNvPicPr>
+              <a:picLocks noChangeAspect="1"/>
+            </p:cNvPicPr>
+            <p:nvPr/>
+          </p:nvPicPr>
+          <p:blipFill>
+            <a:blip r:embed="rId3" cstate="email">
+              <a:extLst>
+                <a:ext uri="{28A0092B-C50C-407E-A947-70E740481C1C}">
+                  <a14:useLocalDpi xmlns:a14="http://schemas.microsoft.com/office/drawing/2010/main" val="0"/>
+                </a:ext>
+              </a:extLst>
+            </a:blip>
+            <a:stretch>
+              <a:fillRect/>
+            </a:stretch>
+          </p:blipFill>
+          <p:spPr>
+            <a:xfrm>
+              <a:off x="3960163" y="1340883"/>
+              <a:ext cx="1373837" cy="1167761"/>
+            </a:xfrm>
+            <a:prstGeom prst="rect">
+              <a:avLst/>
+            </a:prstGeom>
+          </p:spPr>
+        </p:pic>
+        <p:sp>
+          <p:nvSpPr>
+            <p:cNvPr id="11" name="TextBox 10">
+              <a:extLst>
+                <a:ext uri="{FF2B5EF4-FFF2-40B4-BE49-F238E27FC236}">
+                  <a16:creationId xmlns:a16="http://schemas.microsoft.com/office/drawing/2014/main" id="{4B0F382D-0F6D-0B1A-C65C-66574A83ABF4}"/>
+                </a:ext>
+              </a:extLst>
+            </p:cNvPr>
+            <p:cNvSpPr txBox="1"/>
+            <p:nvPr/>
+          </p:nvSpPr>
+          <p:spPr>
+            <a:xfrm>
+              <a:off x="4173303" y="1589014"/>
+              <a:ext cx="1037795" cy="467273"/>
+            </a:xfrm>
+            <a:prstGeom prst="rect">
+              <a:avLst/>
+            </a:prstGeom>
+            <a:noFill/>
+          </p:spPr>
+          <p:txBody>
+            <a:bodyPr wrap="square" rtlCol="0">
+              <a:spAutoFit/>
+            </a:bodyPr>
+            <a:lstStyle/>
+            <a:p>
+              <a:r>
+                <a:rPr lang="en-US" sz="1400" dirty="0"/>
+                <a:t>“I have no self-control.”</a:t>
+              </a:r>
+            </a:p>
+          </p:txBody>
+        </p:sp>
+      </p:grpSp>
+      <p:pic>
+        <p:nvPicPr>
+          <p:cNvPr id="16" name="Picture 15" descr="A picture containing text&#10;&#10;Description automatically generated">
+            <a:extLst>
+              <a:ext uri="{FF2B5EF4-FFF2-40B4-BE49-F238E27FC236}">
+                <a16:creationId xmlns:a16="http://schemas.microsoft.com/office/drawing/2014/main" id="{67FF6F36-4CF0-4F3A-BB72-5B5D205675FE}"/>
+              </a:ext>
+            </a:extLst>
+          </p:cNvPr>
+          <p:cNvPicPr>
+            <a:picLocks noChangeAspect="1"/>
+          </p:cNvPicPr>
+          <p:nvPr/>
+        </p:nvPicPr>
+        <p:blipFill>
+          <a:blip r:embed="rId4" cstate="email">
+            <a:extLst>
+              <a:ext uri="{28A0092B-C50C-407E-A947-70E740481C1C}">
+                <a14:useLocalDpi xmlns:a14="http://schemas.microsoft.com/office/drawing/2010/main" val="0"/>
+              </a:ext>
+            </a:extLst>
+          </a:blip>
+          <a:stretch>
+            <a:fillRect/>
+          </a:stretch>
+        </p:blipFill>
+        <p:spPr>
+          <a:xfrm>
+            <a:off x="6343369" y="1482066"/>
+            <a:ext cx="438430" cy="518809"/>
+          </a:xfrm>
+          <a:prstGeom prst="rect">
+            <a:avLst/>
+          </a:prstGeom>
+        </p:spPr>
+      </p:pic>
+      <p:pic>
+        <p:nvPicPr>
+          <p:cNvPr id="20" name="Picture 19" descr="A picture containing text&#10;&#10;Description automatically generated">
+            <a:extLst>
+              <a:ext uri="{FF2B5EF4-FFF2-40B4-BE49-F238E27FC236}">
+                <a16:creationId xmlns:a16="http://schemas.microsoft.com/office/drawing/2014/main" id="{D75D124C-B2EC-FBAE-C3A0-04313CF55035}"/>
+              </a:ext>
+            </a:extLst>
+          </p:cNvPr>
+          <p:cNvPicPr>
+            <a:picLocks noChangeAspect="1"/>
+          </p:cNvPicPr>
+          <p:nvPr/>
+        </p:nvPicPr>
+        <p:blipFill>
+          <a:blip r:embed="rId4" cstate="email">
+            <a:extLst>
+              <a:ext uri="{28A0092B-C50C-407E-A947-70E740481C1C}">
+                <a14:useLocalDpi xmlns:a14="http://schemas.microsoft.com/office/drawing/2010/main" val="0"/>
+              </a:ext>
+            </a:extLst>
+          </a:blip>
+          <a:stretch>
+            <a:fillRect/>
+          </a:stretch>
+        </p:blipFill>
+        <p:spPr>
+          <a:xfrm>
+            <a:off x="6333985" y="2769004"/>
+            <a:ext cx="438430" cy="518809"/>
+          </a:xfrm>
+          <a:prstGeom prst="rect">
+            <a:avLst/>
+          </a:prstGeom>
+        </p:spPr>
+      </p:pic>
+      <p:pic>
+        <p:nvPicPr>
+          <p:cNvPr id="21" name="Picture 20" descr="A picture containing text&#10;&#10;Description automatically generated">
+            <a:extLst>
+              <a:ext uri="{FF2B5EF4-FFF2-40B4-BE49-F238E27FC236}">
+                <a16:creationId xmlns:a16="http://schemas.microsoft.com/office/drawing/2014/main" id="{F5BB4A46-5D05-0AA9-DEA6-11E222B90022}"/>
+              </a:ext>
+            </a:extLst>
+          </p:cNvPr>
+          <p:cNvPicPr>
+            <a:picLocks noChangeAspect="1"/>
+          </p:cNvPicPr>
+          <p:nvPr/>
+        </p:nvPicPr>
+        <p:blipFill>
+          <a:blip r:embed="rId4" cstate="email">
+            <a:extLst>
+              <a:ext uri="{28A0092B-C50C-407E-A947-70E740481C1C}">
+                <a14:useLocalDpi xmlns:a14="http://schemas.microsoft.com/office/drawing/2010/main" val="0"/>
+              </a:ext>
+            </a:extLst>
+          </a:blip>
+          <a:stretch>
+            <a:fillRect/>
+          </a:stretch>
+        </p:blipFill>
+        <p:spPr>
+          <a:xfrm>
+            <a:off x="6338339" y="3412473"/>
+            <a:ext cx="438430" cy="518809"/>
+          </a:xfrm>
+          <a:prstGeom prst="rect">
+            <a:avLst/>
+          </a:prstGeom>
+        </p:spPr>
+      </p:pic>
+      <p:pic>
+        <p:nvPicPr>
+          <p:cNvPr id="22" name="Picture 21" descr="A picture containing text&#10;&#10;Description automatically generated">
+            <a:extLst>
+              <a:ext uri="{FF2B5EF4-FFF2-40B4-BE49-F238E27FC236}">
+                <a16:creationId xmlns:a16="http://schemas.microsoft.com/office/drawing/2014/main" id="{E56A62FB-32FB-94BD-B20F-893171605FD2}"/>
+              </a:ext>
+            </a:extLst>
+          </p:cNvPr>
+          <p:cNvPicPr>
+            <a:picLocks noChangeAspect="1"/>
+          </p:cNvPicPr>
+          <p:nvPr/>
+        </p:nvPicPr>
+        <p:blipFill>
+          <a:blip r:embed="rId4" cstate="email">
+            <a:extLst>
+              <a:ext uri="{28A0092B-C50C-407E-A947-70E740481C1C}">
+                <a14:useLocalDpi xmlns:a14="http://schemas.microsoft.com/office/drawing/2010/main" val="0"/>
+              </a:ext>
+            </a:extLst>
+          </a:blip>
+          <a:stretch>
+            <a:fillRect/>
+          </a:stretch>
+        </p:blipFill>
+        <p:spPr>
+          <a:xfrm>
+            <a:off x="6333985" y="4055942"/>
+            <a:ext cx="438430" cy="518809"/>
+          </a:xfrm>
+          <a:prstGeom prst="rect">
+            <a:avLst/>
+          </a:prstGeom>
+        </p:spPr>
+      </p:pic>
+      <p:pic>
+        <p:nvPicPr>
+          <p:cNvPr id="27" name="Picture 26" descr="A picture containing text, light&#10;&#10;Description automatically generated">
+            <a:extLst>
+              <a:ext uri="{FF2B5EF4-FFF2-40B4-BE49-F238E27FC236}">
+                <a16:creationId xmlns:a16="http://schemas.microsoft.com/office/drawing/2014/main" id="{68B32DFC-8C2E-B732-78CD-B515A4D5088C}"/>
+              </a:ext>
+            </a:extLst>
+          </p:cNvPr>
+          <p:cNvPicPr>
+            <a:picLocks noChangeAspect="1"/>
+          </p:cNvPicPr>
+          <p:nvPr/>
+        </p:nvPicPr>
+        <p:blipFill>
+          <a:blip r:embed="rId5" cstate="email">
+            <a:extLst>
+              <a:ext uri="{28A0092B-C50C-407E-A947-70E740481C1C}">
+                <a14:useLocalDpi xmlns:a14="http://schemas.microsoft.com/office/drawing/2010/main" val="0"/>
+              </a:ext>
+            </a:extLst>
+          </a:blip>
+          <a:stretch>
+            <a:fillRect/>
+          </a:stretch>
+        </p:blipFill>
+        <p:spPr>
+          <a:xfrm>
+            <a:off x="6343369" y="2127242"/>
+            <a:ext cx="438431" cy="518810"/>
+          </a:xfrm>
+          <a:prstGeom prst="rect">
+            <a:avLst/>
+          </a:prstGeom>
+        </p:spPr>
+      </p:pic>
+      <p:sp>
+        <p:nvSpPr>
+          <p:cNvPr id="28" name="TextBox 27">
+            <a:extLst>
+              <a:ext uri="{FF2B5EF4-FFF2-40B4-BE49-F238E27FC236}">
+                <a16:creationId xmlns:a16="http://schemas.microsoft.com/office/drawing/2014/main" id="{33A7BB53-6F1C-BB59-DBF9-6CE13CAFB3C5}"/>
+              </a:ext>
+            </a:extLst>
+          </p:cNvPr>
+          <p:cNvSpPr txBox="1"/>
+          <p:nvPr/>
+        </p:nvSpPr>
+        <p:spPr>
+          <a:xfrm>
+            <a:off x="6858000" y="2248147"/>
+            <a:ext cx="1447800" cy="307777"/>
+          </a:xfrm>
+          <a:prstGeom prst="rect">
+            <a:avLst/>
+          </a:prstGeom>
+          <a:noFill/>
+        </p:spPr>
+        <p:txBody>
+          <a:bodyPr wrap="square" rtlCol="0">
+            <a:spAutoFit/>
+          </a:bodyPr>
+          <a:lstStyle/>
+          <a:p>
+            <a:r>
+              <a:rPr lang="en-US" sz="1400" dirty="0"/>
+              <a:t>Power &amp; Control</a:t>
+            </a:r>
+          </a:p>
+        </p:txBody>
+      </p:sp>
+      <p:sp>
+        <p:nvSpPr>
+          <p:cNvPr id="29" name="TextBox 28">
+            <a:extLst>
+              <a:ext uri="{FF2B5EF4-FFF2-40B4-BE49-F238E27FC236}">
+                <a16:creationId xmlns:a16="http://schemas.microsoft.com/office/drawing/2014/main" id="{A64A0AE7-9958-D81B-C46D-28ABCE8DDDBE}"/>
+              </a:ext>
+            </a:extLst>
+          </p:cNvPr>
+          <p:cNvSpPr txBox="1"/>
+          <p:nvPr/>
+        </p:nvSpPr>
+        <p:spPr>
+          <a:xfrm>
+            <a:off x="6858000" y="1624112"/>
+            <a:ext cx="1447800" cy="307777"/>
+          </a:xfrm>
+          <a:prstGeom prst="rect">
+            <a:avLst/>
+          </a:prstGeom>
+          <a:noFill/>
+        </p:spPr>
+        <p:txBody>
+          <a:bodyPr wrap="square" rtlCol="0">
+            <a:spAutoFit/>
+          </a:bodyPr>
+          <a:lstStyle/>
+          <a:p>
+            <a:r>
+              <a:rPr lang="en-US" sz="1400" dirty="0"/>
+              <a:t>Attachment</a:t>
+            </a:r>
+          </a:p>
+        </p:txBody>
+      </p:sp>
+      <p:sp>
+        <p:nvSpPr>
+          <p:cNvPr id="30" name="TextBox 29">
+            <a:extLst>
+              <a:ext uri="{FF2B5EF4-FFF2-40B4-BE49-F238E27FC236}">
+                <a16:creationId xmlns:a16="http://schemas.microsoft.com/office/drawing/2014/main" id="{2B11877C-C665-6FD2-6818-81C5EF1ABF2F}"/>
+              </a:ext>
+            </a:extLst>
+          </p:cNvPr>
+          <p:cNvSpPr txBox="1"/>
+          <p:nvPr/>
+        </p:nvSpPr>
+        <p:spPr>
+          <a:xfrm>
+            <a:off x="6858000" y="2889908"/>
+            <a:ext cx="1447800" cy="307777"/>
+          </a:xfrm>
+          <a:prstGeom prst="rect">
+            <a:avLst/>
+          </a:prstGeom>
+          <a:noFill/>
+        </p:spPr>
+        <p:txBody>
+          <a:bodyPr wrap="square" rtlCol="0">
+            <a:spAutoFit/>
+          </a:bodyPr>
+          <a:lstStyle/>
+          <a:p>
+            <a:r>
+              <a:rPr lang="en-US" sz="1400" dirty="0"/>
+              <a:t>Competence</a:t>
+            </a:r>
+          </a:p>
+        </p:txBody>
+      </p:sp>
+      <p:sp>
+        <p:nvSpPr>
+          <p:cNvPr id="31" name="TextBox 30">
+            <a:extLst>
+              <a:ext uri="{FF2B5EF4-FFF2-40B4-BE49-F238E27FC236}">
+                <a16:creationId xmlns:a16="http://schemas.microsoft.com/office/drawing/2014/main" id="{E3336064-41F9-454C-38AA-9908FBF2ACDF}"/>
+              </a:ext>
+            </a:extLst>
+          </p:cNvPr>
+          <p:cNvSpPr txBox="1"/>
+          <p:nvPr/>
+        </p:nvSpPr>
+        <p:spPr>
+          <a:xfrm>
+            <a:off x="6858000" y="3533377"/>
+            <a:ext cx="1447800" cy="307777"/>
+          </a:xfrm>
+          <a:prstGeom prst="rect">
+            <a:avLst/>
+          </a:prstGeom>
+          <a:noFill/>
+        </p:spPr>
+        <p:txBody>
+          <a:bodyPr wrap="square" rtlCol="0">
+            <a:spAutoFit/>
+          </a:bodyPr>
+          <a:lstStyle/>
+          <a:p>
+            <a:r>
+              <a:rPr lang="en-US" sz="1400" dirty="0"/>
+              <a:t>Meta-Cognition</a:t>
+            </a:r>
+          </a:p>
+        </p:txBody>
+      </p:sp>
+      <p:sp>
+        <p:nvSpPr>
+          <p:cNvPr id="32" name="TextBox 31">
+            <a:extLst>
+              <a:ext uri="{FF2B5EF4-FFF2-40B4-BE49-F238E27FC236}">
+                <a16:creationId xmlns:a16="http://schemas.microsoft.com/office/drawing/2014/main" id="{962B12F6-AFF6-C3D5-16D0-05A6CDDE4681}"/>
+              </a:ext>
+            </a:extLst>
+          </p:cNvPr>
+          <p:cNvSpPr txBox="1"/>
+          <p:nvPr/>
+        </p:nvSpPr>
+        <p:spPr>
+          <a:xfrm>
+            <a:off x="6858000" y="4176846"/>
+            <a:ext cx="1447800" cy="307777"/>
+          </a:xfrm>
+          <a:prstGeom prst="rect">
+            <a:avLst/>
+          </a:prstGeom>
+          <a:noFill/>
+        </p:spPr>
+        <p:txBody>
+          <a:bodyPr wrap="square" rtlCol="0">
+            <a:spAutoFit/>
+          </a:bodyPr>
+          <a:lstStyle/>
+          <a:p>
+            <a:r>
+              <a:rPr lang="en-US" sz="1400" dirty="0"/>
+              <a:t>Other People</a:t>
+            </a:r>
+          </a:p>
+        </p:txBody>
+      </p:sp>
+      <p:sp>
+        <p:nvSpPr>
+          <p:cNvPr id="33" name="Arrow: Right 32">
+            <a:extLst>
+              <a:ext uri="{FF2B5EF4-FFF2-40B4-BE49-F238E27FC236}">
+                <a16:creationId xmlns:a16="http://schemas.microsoft.com/office/drawing/2014/main" id="{7C0EF32F-89CC-6EC0-5EA4-C07AD86EC0EF}"/>
+              </a:ext>
+            </a:extLst>
+          </p:cNvPr>
+          <p:cNvSpPr/>
+          <p:nvPr/>
+        </p:nvSpPr>
+        <p:spPr>
+          <a:xfrm rot="559460">
+            <a:off x="5412258" y="2083657"/>
+            <a:ext cx="785906" cy="256398"/>
+          </a:xfrm>
+          <a:prstGeom prst="rightArrow">
+            <a:avLst/>
+          </a:prstGeom>
+        </p:spPr>
+        <p:style>
+          <a:lnRef idx="2">
+            <a:schemeClr val="accent6">
+              <a:shade val="50000"/>
+            </a:schemeClr>
+          </a:lnRef>
+          <a:fillRef idx="1">
+            <a:schemeClr val="accent6"/>
+          </a:fillRef>
+          <a:effectRef idx="0">
+            <a:schemeClr val="accent6"/>
+          </a:effectRef>
+          <a:fontRef idx="minor">
+            <a:schemeClr val="lt1"/>
+          </a:fontRef>
+        </p:style>
+        <p:txBody>
+          <a:bodyPr rtlCol="0" anchor="ctr"/>
+          <a:lstStyle/>
+          <a:p>
+            <a:pPr algn="ctr"/>
+            <a:endParaRPr lang="en-US"/>
           </a:p>
         </p:txBody>
       </p:sp>
     </p:spTree>
     <p:extLst>
       <p:ext uri="{BB962C8B-B14F-4D97-AF65-F5344CB8AC3E}">
-        <p14:creationId xmlns:p14="http://schemas.microsoft.com/office/powerpoint/2010/main" val="2890275294"/>
+        <p14:creationId xmlns:p14="http://schemas.microsoft.com/office/powerpoint/2010/main" val="3446298505"/>
       </p:ext>
     </p:extLst>
   </p:cSld>
@@ -6968,6 +7705,2013 @@
       </p:grpSpPr>
       <p:sp>
         <p:nvSpPr>
+          <p:cNvPr id="2" name="Title 1">
+            <a:extLst>
+              <a:ext uri="{FF2B5EF4-FFF2-40B4-BE49-F238E27FC236}">
+                <a16:creationId xmlns:a16="http://schemas.microsoft.com/office/drawing/2014/main" id="{389411C4-C78F-27B6-05D0-871EEF60F719}"/>
+              </a:ext>
+            </a:extLst>
+          </p:cNvPr>
+          <p:cNvSpPr txBox="1">
+            <a:spLocks/>
+          </p:cNvSpPr>
+          <p:nvPr/>
+        </p:nvSpPr>
+        <p:spPr>
+          <a:xfrm>
+            <a:off x="822960" y="214953"/>
+            <a:ext cx="7543800" cy="527997"/>
+          </a:xfrm>
+          <a:prstGeom prst="rect">
+            <a:avLst/>
+          </a:prstGeom>
+        </p:spPr>
+        <p:txBody>
+          <a:bodyPr/>
+          <a:lstStyle>
+            <a:lvl1pPr algn="l" defTabSz="685800" rtl="0" eaLnBrk="1" latinLnBrk="0" hangingPunct="1">
+              <a:lnSpc>
+                <a:spcPct val="85000"/>
+              </a:lnSpc>
+              <a:spcBef>
+                <a:spcPct val="0"/>
+              </a:spcBef>
+              <a:buNone/>
+              <a:defRPr sz="3600" kern="1200" spc="-38" baseline="0">
+                <a:solidFill>
+                  <a:schemeClr val="tx1">
+                    <a:lumMod val="75000"/>
+                    <a:lumOff val="25000"/>
+                  </a:schemeClr>
+                </a:solidFill>
+                <a:latin typeface="+mj-lt"/>
+                <a:ea typeface="+mj-ea"/>
+                <a:cs typeface="+mj-cs"/>
+              </a:defRPr>
+            </a:lvl1pPr>
+          </a:lstStyle>
+          <a:p>
+            <a:r>
+              <a:rPr lang="en-US" dirty="0"/>
+              <a:t>Preprocessing and Prediction</a:t>
+            </a:r>
+          </a:p>
+        </p:txBody>
+      </p:sp>
+      <p:cxnSp>
+        <p:nvCxnSpPr>
+          <p:cNvPr id="4" name="Straight Connector 3">
+            <a:extLst>
+              <a:ext uri="{FF2B5EF4-FFF2-40B4-BE49-F238E27FC236}">
+                <a16:creationId xmlns:a16="http://schemas.microsoft.com/office/drawing/2014/main" id="{7F076B9D-8F67-0FA3-1F17-90578805F690}"/>
+              </a:ext>
+            </a:extLst>
+          </p:cNvPr>
+          <p:cNvCxnSpPr/>
+          <p:nvPr/>
+        </p:nvCxnSpPr>
+        <p:spPr>
+          <a:xfrm>
+            <a:off x="838200" y="819150"/>
+            <a:ext cx="7543800" cy="0"/>
+          </a:xfrm>
+          <a:prstGeom prst="line">
+            <a:avLst/>
+          </a:prstGeom>
+          <a:ln>
+            <a:solidFill>
+              <a:schemeClr val="bg1">
+                <a:lumMod val="75000"/>
+              </a:schemeClr>
+            </a:solidFill>
+          </a:ln>
+        </p:spPr>
+        <p:style>
+          <a:lnRef idx="1">
+            <a:schemeClr val="dk1"/>
+          </a:lnRef>
+          <a:fillRef idx="0">
+            <a:schemeClr val="dk1"/>
+          </a:fillRef>
+          <a:effectRef idx="0">
+            <a:schemeClr val="dk1"/>
+          </a:effectRef>
+          <a:fontRef idx="minor">
+            <a:schemeClr val="tx1"/>
+          </a:fontRef>
+        </p:style>
+      </p:cxnSp>
+      <p:grpSp>
+        <p:nvGrpSpPr>
+          <p:cNvPr id="15" name="Group 14">
+            <a:extLst>
+              <a:ext uri="{FF2B5EF4-FFF2-40B4-BE49-F238E27FC236}">
+                <a16:creationId xmlns:a16="http://schemas.microsoft.com/office/drawing/2014/main" id="{A8347E53-D9C4-37FD-8EDE-3B429F557814}"/>
+              </a:ext>
+            </a:extLst>
+          </p:cNvPr>
+          <p:cNvGrpSpPr/>
+          <p:nvPr/>
+        </p:nvGrpSpPr>
+        <p:grpSpPr>
+          <a:xfrm>
+            <a:off x="478920" y="1747702"/>
+            <a:ext cx="1455812" cy="1237441"/>
+            <a:chOff x="296789" y="1567306"/>
+            <a:chExt cx="1455812" cy="1237441"/>
+          </a:xfrm>
+        </p:grpSpPr>
+        <p:pic>
+          <p:nvPicPr>
+            <p:cNvPr id="9" name="Picture 8" descr="Icon&#10;&#10;Description automatically generated">
+              <a:extLst>
+                <a:ext uri="{FF2B5EF4-FFF2-40B4-BE49-F238E27FC236}">
+                  <a16:creationId xmlns:a16="http://schemas.microsoft.com/office/drawing/2014/main" id="{197C0ACA-83D8-ED6B-6EFD-81D30E4A422C}"/>
+                </a:ext>
+              </a:extLst>
+            </p:cNvPr>
+            <p:cNvPicPr>
+              <a:picLocks noChangeAspect="1"/>
+            </p:cNvPicPr>
+            <p:nvPr/>
+          </p:nvPicPr>
+          <p:blipFill>
+            <a:blip r:embed="rId2" cstate="email">
+              <a:extLst>
+                <a:ext uri="{28A0092B-C50C-407E-A947-70E740481C1C}">
+                  <a14:useLocalDpi xmlns:a14="http://schemas.microsoft.com/office/drawing/2010/main" val="0"/>
+                </a:ext>
+              </a:extLst>
+            </a:blip>
+            <a:stretch>
+              <a:fillRect/>
+            </a:stretch>
+          </p:blipFill>
+          <p:spPr>
+            <a:xfrm>
+              <a:off x="296789" y="1567306"/>
+              <a:ext cx="1455812" cy="1237441"/>
+            </a:xfrm>
+            <a:prstGeom prst="rect">
+              <a:avLst/>
+            </a:prstGeom>
+          </p:spPr>
+        </p:pic>
+        <p:sp>
+          <p:nvSpPr>
+            <p:cNvPr id="13" name="TextBox 12">
+              <a:extLst>
+                <a:ext uri="{FF2B5EF4-FFF2-40B4-BE49-F238E27FC236}">
+                  <a16:creationId xmlns:a16="http://schemas.microsoft.com/office/drawing/2014/main" id="{696B0D6F-A158-390B-A279-BBE8547DCEAC}"/>
+                </a:ext>
+              </a:extLst>
+            </p:cNvPr>
+            <p:cNvSpPr txBox="1"/>
+            <p:nvPr/>
+          </p:nvSpPr>
+          <p:spPr>
+            <a:xfrm>
+              <a:off x="533400" y="1885950"/>
+              <a:ext cx="1219200" cy="461665"/>
+            </a:xfrm>
+            <a:prstGeom prst="rect">
+              <a:avLst/>
+            </a:prstGeom>
+            <a:noFill/>
+          </p:spPr>
+          <p:txBody>
+            <a:bodyPr wrap="square" rtlCol="0">
+              <a:spAutoFit/>
+            </a:bodyPr>
+            <a:lstStyle/>
+            <a:p>
+              <a:r>
+                <a:rPr lang="en-US" sz="1200" i="1" dirty="0"/>
+                <a:t>“I have no self-control.”</a:t>
+              </a:r>
+            </a:p>
+          </p:txBody>
+        </p:sp>
+      </p:grpSp>
+      <p:sp>
+        <p:nvSpPr>
+          <p:cNvPr id="34" name="TextBox 33">
+            <a:extLst>
+              <a:ext uri="{FF2B5EF4-FFF2-40B4-BE49-F238E27FC236}">
+                <a16:creationId xmlns:a16="http://schemas.microsoft.com/office/drawing/2014/main" id="{90401E8B-49DA-604D-8DF6-38397236159A}"/>
+              </a:ext>
+            </a:extLst>
+          </p:cNvPr>
+          <p:cNvSpPr txBox="1"/>
+          <p:nvPr/>
+        </p:nvSpPr>
+        <p:spPr>
+          <a:xfrm>
+            <a:off x="685799" y="971550"/>
+            <a:ext cx="1248933" cy="369332"/>
+          </a:xfrm>
+          <a:prstGeom prst="rect">
+            <a:avLst/>
+          </a:prstGeom>
+          <a:noFill/>
+        </p:spPr>
+        <p:txBody>
+          <a:bodyPr wrap="square" rtlCol="0">
+            <a:spAutoFit/>
+          </a:bodyPr>
+          <a:lstStyle/>
+          <a:p>
+            <a:r>
+              <a:rPr lang="en-US" u="sng" dirty="0"/>
+              <a:t>Utterances</a:t>
+            </a:r>
+          </a:p>
+        </p:txBody>
+      </p:sp>
+      <p:sp>
+        <p:nvSpPr>
+          <p:cNvPr id="35" name="TextBox 34">
+            <a:extLst>
+              <a:ext uri="{FF2B5EF4-FFF2-40B4-BE49-F238E27FC236}">
+                <a16:creationId xmlns:a16="http://schemas.microsoft.com/office/drawing/2014/main" id="{044299DF-1F85-A127-7F5A-C51F66897C9A}"/>
+              </a:ext>
+            </a:extLst>
+          </p:cNvPr>
+          <p:cNvSpPr txBox="1"/>
+          <p:nvPr/>
+        </p:nvSpPr>
+        <p:spPr>
+          <a:xfrm>
+            <a:off x="3435623" y="971550"/>
+            <a:ext cx="1248933" cy="646331"/>
+          </a:xfrm>
+          <a:prstGeom prst="rect">
+            <a:avLst/>
+          </a:prstGeom>
+          <a:noFill/>
+        </p:spPr>
+        <p:txBody>
+          <a:bodyPr wrap="square" rtlCol="0">
+            <a:spAutoFit/>
+          </a:bodyPr>
+          <a:lstStyle/>
+          <a:p>
+            <a:r>
+              <a:rPr lang="en-US" u="sng" dirty="0"/>
+              <a:t>Embedding Levels</a:t>
+            </a:r>
+          </a:p>
+        </p:txBody>
+      </p:sp>
+      <p:sp>
+        <p:nvSpPr>
+          <p:cNvPr id="38" name="TextBox 37">
+            <a:extLst>
+              <a:ext uri="{FF2B5EF4-FFF2-40B4-BE49-F238E27FC236}">
+                <a16:creationId xmlns:a16="http://schemas.microsoft.com/office/drawing/2014/main" id="{9D549B7F-4252-B2D5-EFB1-6B0C2D05E295}"/>
+              </a:ext>
+            </a:extLst>
+          </p:cNvPr>
+          <p:cNvSpPr txBox="1"/>
+          <p:nvPr/>
+        </p:nvSpPr>
+        <p:spPr>
+          <a:xfrm>
+            <a:off x="5334001" y="971550"/>
+            <a:ext cx="990600" cy="369332"/>
+          </a:xfrm>
+          <a:prstGeom prst="rect">
+            <a:avLst/>
+          </a:prstGeom>
+          <a:noFill/>
+        </p:spPr>
+        <p:txBody>
+          <a:bodyPr wrap="square" rtlCol="0">
+            <a:spAutoFit/>
+          </a:bodyPr>
+          <a:lstStyle/>
+          <a:p>
+            <a:r>
+              <a:rPr lang="en-US" u="sng" dirty="0"/>
+              <a:t>Models</a:t>
+            </a:r>
+          </a:p>
+        </p:txBody>
+      </p:sp>
+      <p:sp>
+        <p:nvSpPr>
+          <p:cNvPr id="39" name="TextBox 38">
+            <a:extLst>
+              <a:ext uri="{FF2B5EF4-FFF2-40B4-BE49-F238E27FC236}">
+                <a16:creationId xmlns:a16="http://schemas.microsoft.com/office/drawing/2014/main" id="{692AFC93-17F8-982A-C5CC-9FE4ACE3CCF0}"/>
+              </a:ext>
+            </a:extLst>
+          </p:cNvPr>
+          <p:cNvSpPr txBox="1"/>
+          <p:nvPr/>
+        </p:nvSpPr>
+        <p:spPr>
+          <a:xfrm>
+            <a:off x="6934200" y="971550"/>
+            <a:ext cx="1066800" cy="369332"/>
+          </a:xfrm>
+          <a:prstGeom prst="rect">
+            <a:avLst/>
+          </a:prstGeom>
+          <a:noFill/>
+        </p:spPr>
+        <p:txBody>
+          <a:bodyPr wrap="square" rtlCol="0">
+            <a:spAutoFit/>
+          </a:bodyPr>
+          <a:lstStyle/>
+          <a:p>
+            <a:r>
+              <a:rPr lang="en-US" u="sng" dirty="0"/>
+              <a:t>Schemas</a:t>
+            </a:r>
+          </a:p>
+        </p:txBody>
+      </p:sp>
+      <p:pic>
+        <p:nvPicPr>
+          <p:cNvPr id="42" name="Picture 41" descr="Chart&#10;&#10;Description automatically generated">
+            <a:extLst>
+              <a:ext uri="{FF2B5EF4-FFF2-40B4-BE49-F238E27FC236}">
+                <a16:creationId xmlns:a16="http://schemas.microsoft.com/office/drawing/2014/main" id="{F672334F-BDCB-B476-A05E-CAC9F7B95BFF}"/>
+              </a:ext>
+            </a:extLst>
+          </p:cNvPr>
+          <p:cNvPicPr>
+            <a:picLocks noChangeAspect="1"/>
+          </p:cNvPicPr>
+          <p:nvPr/>
+        </p:nvPicPr>
+        <p:blipFill>
+          <a:blip r:embed="rId3" cstate="email">
+            <a:extLst>
+              <a:ext uri="{28A0092B-C50C-407E-A947-70E740481C1C}">
+                <a14:useLocalDpi xmlns:a14="http://schemas.microsoft.com/office/drawing/2010/main" val="0"/>
+              </a:ext>
+            </a:extLst>
+          </a:blip>
+          <a:stretch>
+            <a:fillRect/>
+          </a:stretch>
+        </p:blipFill>
+        <p:spPr>
+          <a:xfrm>
+            <a:off x="5447649" y="1363897"/>
+            <a:ext cx="887309" cy="883816"/>
+          </a:xfrm>
+          <a:prstGeom prst="rect">
+            <a:avLst/>
+          </a:prstGeom>
+        </p:spPr>
+      </p:pic>
+      <p:pic>
+        <p:nvPicPr>
+          <p:cNvPr id="44" name="Picture 43" descr="A picture containing diagram&#10;&#10;Description automatically generated">
+            <a:extLst>
+              <a:ext uri="{FF2B5EF4-FFF2-40B4-BE49-F238E27FC236}">
+                <a16:creationId xmlns:a16="http://schemas.microsoft.com/office/drawing/2014/main" id="{729B4125-81AB-ECB4-8743-691FFBF714C6}"/>
+              </a:ext>
+            </a:extLst>
+          </p:cNvPr>
+          <p:cNvPicPr>
+            <a:picLocks noChangeAspect="1"/>
+          </p:cNvPicPr>
+          <p:nvPr/>
+        </p:nvPicPr>
+        <p:blipFill>
+          <a:blip r:embed="rId4" cstate="email">
+            <a:extLst>
+              <a:ext uri="{28A0092B-C50C-407E-A947-70E740481C1C}">
+                <a14:useLocalDpi xmlns:a14="http://schemas.microsoft.com/office/drawing/2010/main" val="0"/>
+              </a:ext>
+            </a:extLst>
+          </a:blip>
+          <a:stretch>
+            <a:fillRect/>
+          </a:stretch>
+        </p:blipFill>
+        <p:spPr>
+          <a:xfrm>
+            <a:off x="5332475" y="2288612"/>
+            <a:ext cx="1190467" cy="1119395"/>
+          </a:xfrm>
+          <a:prstGeom prst="rect">
+            <a:avLst/>
+          </a:prstGeom>
+        </p:spPr>
+      </p:pic>
+      <p:pic>
+        <p:nvPicPr>
+          <p:cNvPr id="46" name="Picture 45" descr="A picture containing text, clock&#10;&#10;Description automatically generated">
+            <a:extLst>
+              <a:ext uri="{FF2B5EF4-FFF2-40B4-BE49-F238E27FC236}">
+                <a16:creationId xmlns:a16="http://schemas.microsoft.com/office/drawing/2014/main" id="{A22AAD98-65CE-BF12-16CC-6DBB5DEC3121}"/>
+              </a:ext>
+            </a:extLst>
+          </p:cNvPr>
+          <p:cNvPicPr>
+            <a:picLocks noChangeAspect="1"/>
+          </p:cNvPicPr>
+          <p:nvPr/>
+        </p:nvPicPr>
+        <p:blipFill>
+          <a:blip r:embed="rId5" cstate="email">
+            <a:extLst>
+              <a:ext uri="{28A0092B-C50C-407E-A947-70E740481C1C}">
+                <a14:useLocalDpi xmlns:a14="http://schemas.microsoft.com/office/drawing/2010/main" val="0"/>
+              </a:ext>
+            </a:extLst>
+          </a:blip>
+          <a:stretch>
+            <a:fillRect/>
+          </a:stretch>
+        </p:blipFill>
+        <p:spPr>
+          <a:xfrm>
+            <a:off x="5575967" y="3499994"/>
+            <a:ext cx="630672" cy="979110"/>
+          </a:xfrm>
+          <a:prstGeom prst="rect">
+            <a:avLst/>
+          </a:prstGeom>
+        </p:spPr>
+      </p:pic>
+      <p:grpSp>
+        <p:nvGrpSpPr>
+          <p:cNvPr id="49" name="Group 48">
+            <a:extLst>
+              <a:ext uri="{FF2B5EF4-FFF2-40B4-BE49-F238E27FC236}">
+                <a16:creationId xmlns:a16="http://schemas.microsoft.com/office/drawing/2014/main" id="{126C1765-B524-0989-C3B7-3F4328490B7D}"/>
+              </a:ext>
+            </a:extLst>
+          </p:cNvPr>
+          <p:cNvGrpSpPr/>
+          <p:nvPr/>
+        </p:nvGrpSpPr>
+        <p:grpSpPr>
+          <a:xfrm>
+            <a:off x="3525839" y="3348140"/>
+            <a:ext cx="1294735" cy="889683"/>
+            <a:chOff x="3683115" y="2151204"/>
+            <a:chExt cx="1294735" cy="889683"/>
+          </a:xfrm>
+        </p:grpSpPr>
+        <p:sp>
+          <p:nvSpPr>
+            <p:cNvPr id="37" name="TextBox 36">
+              <a:extLst>
+                <a:ext uri="{FF2B5EF4-FFF2-40B4-BE49-F238E27FC236}">
+                  <a16:creationId xmlns:a16="http://schemas.microsoft.com/office/drawing/2014/main" id="{37BB334E-E09E-ABF2-5014-0E990574C534}"/>
+                </a:ext>
+              </a:extLst>
+            </p:cNvPr>
+            <p:cNvSpPr txBox="1"/>
+            <p:nvPr/>
+          </p:nvSpPr>
+          <p:spPr>
+            <a:xfrm>
+              <a:off x="3892473" y="2151204"/>
+              <a:ext cx="887309" cy="276999"/>
+            </a:xfrm>
+            <a:prstGeom prst="rect">
+              <a:avLst/>
+            </a:prstGeom>
+            <a:noFill/>
+          </p:spPr>
+          <p:txBody>
+            <a:bodyPr wrap="square" rtlCol="0">
+              <a:spAutoFit/>
+            </a:bodyPr>
+            <a:lstStyle/>
+            <a:p>
+              <a:r>
+                <a:rPr lang="en-US" sz="1200" i="1" dirty="0"/>
+                <a:t>Word-level</a:t>
+              </a:r>
+            </a:p>
+          </p:txBody>
+        </p:sp>
+        <p:pic>
+          <p:nvPicPr>
+            <p:cNvPr id="48" name="Picture 47" descr="A picture containing shoji, building&#10;&#10;Description automatically generated">
+              <a:extLst>
+                <a:ext uri="{FF2B5EF4-FFF2-40B4-BE49-F238E27FC236}">
+                  <a16:creationId xmlns:a16="http://schemas.microsoft.com/office/drawing/2014/main" id="{27D442B5-6C97-3CDE-0CAC-502E098F8B17}"/>
+                </a:ext>
+              </a:extLst>
+            </p:cNvPr>
+            <p:cNvPicPr>
+              <a:picLocks noChangeAspect="1"/>
+            </p:cNvPicPr>
+            <p:nvPr/>
+          </p:nvPicPr>
+          <p:blipFill>
+            <a:blip r:embed="rId6" cstate="email">
+              <a:extLst>
+                <a:ext uri="{28A0092B-C50C-407E-A947-70E740481C1C}">
+                  <a14:useLocalDpi xmlns:a14="http://schemas.microsoft.com/office/drawing/2010/main" val="0"/>
+                </a:ext>
+              </a:extLst>
+            </a:blip>
+            <a:stretch>
+              <a:fillRect/>
+            </a:stretch>
+          </p:blipFill>
+          <p:spPr>
+            <a:xfrm>
+              <a:off x="3683115" y="2406913"/>
+              <a:ext cx="1294735" cy="633974"/>
+            </a:xfrm>
+            <a:prstGeom prst="rect">
+              <a:avLst/>
+            </a:prstGeom>
+          </p:spPr>
+        </p:pic>
+      </p:grpSp>
+      <p:grpSp>
+        <p:nvGrpSpPr>
+          <p:cNvPr id="52" name="Group 51">
+            <a:extLst>
+              <a:ext uri="{FF2B5EF4-FFF2-40B4-BE49-F238E27FC236}">
+                <a16:creationId xmlns:a16="http://schemas.microsoft.com/office/drawing/2014/main" id="{C7DD948C-2A19-3507-6546-3870006585F6}"/>
+              </a:ext>
+            </a:extLst>
+          </p:cNvPr>
+          <p:cNvGrpSpPr/>
+          <p:nvPr/>
+        </p:nvGrpSpPr>
+        <p:grpSpPr>
+          <a:xfrm>
+            <a:off x="3520112" y="1959784"/>
+            <a:ext cx="1255555" cy="489555"/>
+            <a:chOff x="3735733" y="3837543"/>
+            <a:chExt cx="1255555" cy="489555"/>
+          </a:xfrm>
+        </p:grpSpPr>
+        <p:sp>
+          <p:nvSpPr>
+            <p:cNvPr id="36" name="TextBox 35">
+              <a:extLst>
+                <a:ext uri="{FF2B5EF4-FFF2-40B4-BE49-F238E27FC236}">
+                  <a16:creationId xmlns:a16="http://schemas.microsoft.com/office/drawing/2014/main" id="{44E7BCFE-77B9-A09B-53B2-C6563DFA381D}"/>
+                </a:ext>
+              </a:extLst>
+            </p:cNvPr>
+            <p:cNvSpPr txBox="1"/>
+            <p:nvPr/>
+          </p:nvSpPr>
+          <p:spPr>
+            <a:xfrm>
+              <a:off x="3770937" y="3837543"/>
+              <a:ext cx="1140252" cy="276999"/>
+            </a:xfrm>
+            <a:prstGeom prst="rect">
+              <a:avLst/>
+            </a:prstGeom>
+            <a:noFill/>
+          </p:spPr>
+          <p:txBody>
+            <a:bodyPr wrap="square" rtlCol="0">
+              <a:spAutoFit/>
+            </a:bodyPr>
+            <a:lstStyle/>
+            <a:p>
+              <a:r>
+                <a:rPr lang="en-US" sz="1200" i="1" dirty="0"/>
+                <a:t>Utterance-level</a:t>
+              </a:r>
+            </a:p>
+          </p:txBody>
+        </p:sp>
+        <p:pic>
+          <p:nvPicPr>
+            <p:cNvPr id="51" name="Picture 50" descr="A picture containing shoji, table&#10;&#10;Description automatically generated">
+              <a:extLst>
+                <a:ext uri="{FF2B5EF4-FFF2-40B4-BE49-F238E27FC236}">
+                  <a16:creationId xmlns:a16="http://schemas.microsoft.com/office/drawing/2014/main" id="{476BF892-A7FE-623B-B04F-13446905FD8F}"/>
+                </a:ext>
+              </a:extLst>
+            </p:cNvPr>
+            <p:cNvPicPr>
+              <a:picLocks noChangeAspect="1"/>
+            </p:cNvPicPr>
+            <p:nvPr/>
+          </p:nvPicPr>
+          <p:blipFill>
+            <a:blip r:embed="rId7" cstate="email">
+              <a:extLst>
+                <a:ext uri="{28A0092B-C50C-407E-A947-70E740481C1C}">
+                  <a14:useLocalDpi xmlns:a14="http://schemas.microsoft.com/office/drawing/2010/main" val="0"/>
+                </a:ext>
+              </a:extLst>
+            </a:blip>
+            <a:stretch>
+              <a:fillRect/>
+            </a:stretch>
+          </p:blipFill>
+          <p:spPr>
+            <a:xfrm>
+              <a:off x="3735733" y="4128047"/>
+              <a:ext cx="1255555" cy="199051"/>
+            </a:xfrm>
+            <a:prstGeom prst="rect">
+              <a:avLst/>
+            </a:prstGeom>
+          </p:spPr>
+        </p:pic>
+      </p:grpSp>
+      <p:sp>
+        <p:nvSpPr>
+          <p:cNvPr id="53" name="TextBox 52">
+            <a:extLst>
+              <a:ext uri="{FF2B5EF4-FFF2-40B4-BE49-F238E27FC236}">
+                <a16:creationId xmlns:a16="http://schemas.microsoft.com/office/drawing/2014/main" id="{0F0BD7DB-70FD-670E-8751-5795BCF9ABC5}"/>
+              </a:ext>
+            </a:extLst>
+          </p:cNvPr>
+          <p:cNvSpPr txBox="1"/>
+          <p:nvPr/>
+        </p:nvSpPr>
+        <p:spPr>
+          <a:xfrm>
+            <a:off x="5157214" y="1410720"/>
+            <a:ext cx="482410" cy="276999"/>
+          </a:xfrm>
+          <a:prstGeom prst="rect">
+            <a:avLst/>
+          </a:prstGeom>
+          <a:noFill/>
+        </p:spPr>
+        <p:txBody>
+          <a:bodyPr wrap="square" rtlCol="0">
+            <a:spAutoFit/>
+          </a:bodyPr>
+          <a:lstStyle/>
+          <a:p>
+            <a:r>
+              <a:rPr lang="en-US" sz="1200" i="1" dirty="0" err="1"/>
+              <a:t>kNN</a:t>
+            </a:r>
+            <a:endParaRPr lang="en-US" sz="1200" i="1" dirty="0"/>
+          </a:p>
+        </p:txBody>
+      </p:sp>
+      <p:sp>
+        <p:nvSpPr>
+          <p:cNvPr id="54" name="TextBox 53">
+            <a:extLst>
+              <a:ext uri="{FF2B5EF4-FFF2-40B4-BE49-F238E27FC236}">
+                <a16:creationId xmlns:a16="http://schemas.microsoft.com/office/drawing/2014/main" id="{066E8632-76CB-AB79-2A17-A75AA3F08B85}"/>
+              </a:ext>
+            </a:extLst>
+          </p:cNvPr>
+          <p:cNvSpPr txBox="1"/>
+          <p:nvPr/>
+        </p:nvSpPr>
+        <p:spPr>
+          <a:xfrm>
+            <a:off x="5157214" y="2212411"/>
+            <a:ext cx="482410" cy="276999"/>
+          </a:xfrm>
+          <a:prstGeom prst="rect">
+            <a:avLst/>
+          </a:prstGeom>
+          <a:noFill/>
+        </p:spPr>
+        <p:txBody>
+          <a:bodyPr wrap="square" rtlCol="0">
+            <a:spAutoFit/>
+          </a:bodyPr>
+          <a:lstStyle/>
+          <a:p>
+            <a:r>
+              <a:rPr lang="en-US" sz="1200" i="1" dirty="0"/>
+              <a:t>SVM</a:t>
+            </a:r>
+          </a:p>
+        </p:txBody>
+      </p:sp>
+      <p:sp>
+        <p:nvSpPr>
+          <p:cNvPr id="55" name="TextBox 54">
+            <a:extLst>
+              <a:ext uri="{FF2B5EF4-FFF2-40B4-BE49-F238E27FC236}">
+                <a16:creationId xmlns:a16="http://schemas.microsoft.com/office/drawing/2014/main" id="{4658D251-CB42-D3A7-93C7-3EAF9F58F5CE}"/>
+              </a:ext>
+            </a:extLst>
+          </p:cNvPr>
+          <p:cNvSpPr txBox="1"/>
+          <p:nvPr/>
+        </p:nvSpPr>
+        <p:spPr>
+          <a:xfrm>
+            <a:off x="5162605" y="3493516"/>
+            <a:ext cx="521923" cy="276999"/>
+          </a:xfrm>
+          <a:prstGeom prst="rect">
+            <a:avLst/>
+          </a:prstGeom>
+          <a:noFill/>
+        </p:spPr>
+        <p:txBody>
+          <a:bodyPr wrap="square" rtlCol="0">
+            <a:spAutoFit/>
+          </a:bodyPr>
+          <a:lstStyle/>
+          <a:p>
+            <a:r>
+              <a:rPr lang="en-US" sz="1200" i="1" dirty="0"/>
+              <a:t>LSTM</a:t>
+            </a:r>
+          </a:p>
+        </p:txBody>
+      </p:sp>
+      <p:pic>
+        <p:nvPicPr>
+          <p:cNvPr id="57" name="Picture 56" descr="A picture containing hanger&#10;&#10;Description automatically generated">
+            <a:extLst>
+              <a:ext uri="{FF2B5EF4-FFF2-40B4-BE49-F238E27FC236}">
+                <a16:creationId xmlns:a16="http://schemas.microsoft.com/office/drawing/2014/main" id="{109B1DEA-310D-E29F-2AC5-159F6EA6D1FC}"/>
+              </a:ext>
+            </a:extLst>
+          </p:cNvPr>
+          <p:cNvPicPr>
+            <a:picLocks noChangeAspect="1"/>
+          </p:cNvPicPr>
+          <p:nvPr/>
+        </p:nvPicPr>
+        <p:blipFill>
+          <a:blip r:embed="rId8" cstate="email">
+            <a:extLst>
+              <a:ext uri="{28A0092B-C50C-407E-A947-70E740481C1C}">
+                <a14:useLocalDpi xmlns:a14="http://schemas.microsoft.com/office/drawing/2010/main" val="0"/>
+              </a:ext>
+            </a:extLst>
+          </a:blip>
+          <a:stretch>
+            <a:fillRect/>
+          </a:stretch>
+        </p:blipFill>
+        <p:spPr>
+          <a:xfrm>
+            <a:off x="2251138" y="2091751"/>
+            <a:ext cx="982255" cy="1227819"/>
+          </a:xfrm>
+          <a:prstGeom prst="rect">
+            <a:avLst/>
+          </a:prstGeom>
+        </p:spPr>
+      </p:pic>
+      <p:sp>
+        <p:nvSpPr>
+          <p:cNvPr id="58" name="TextBox 57">
+            <a:extLst>
+              <a:ext uri="{FF2B5EF4-FFF2-40B4-BE49-F238E27FC236}">
+                <a16:creationId xmlns:a16="http://schemas.microsoft.com/office/drawing/2014/main" id="{F8D4DE9D-95D6-304A-453D-38A4EB929956}"/>
+              </a:ext>
+            </a:extLst>
+          </p:cNvPr>
+          <p:cNvSpPr txBox="1"/>
+          <p:nvPr/>
+        </p:nvSpPr>
+        <p:spPr>
+          <a:xfrm>
+            <a:off x="2507156" y="2807272"/>
+            <a:ext cx="671305" cy="276999"/>
+          </a:xfrm>
+          <a:prstGeom prst="rect">
+            <a:avLst/>
+          </a:prstGeom>
+          <a:noFill/>
+        </p:spPr>
+        <p:txBody>
+          <a:bodyPr wrap="square" rtlCol="0">
+            <a:spAutoFit/>
+          </a:bodyPr>
+          <a:lstStyle/>
+          <a:p>
+            <a:r>
+              <a:rPr lang="en-US" sz="1200" i="1" dirty="0" err="1"/>
+              <a:t>GLoVe</a:t>
+            </a:r>
+            <a:endParaRPr lang="en-US" sz="1200" i="1" dirty="0"/>
+          </a:p>
+        </p:txBody>
+      </p:sp>
+      <p:grpSp>
+        <p:nvGrpSpPr>
+          <p:cNvPr id="59" name="Group 58">
+            <a:extLst>
+              <a:ext uri="{FF2B5EF4-FFF2-40B4-BE49-F238E27FC236}">
+                <a16:creationId xmlns:a16="http://schemas.microsoft.com/office/drawing/2014/main" id="{59DE59B8-6E4D-FA7D-5E60-B5A8D28977D5}"/>
+              </a:ext>
+            </a:extLst>
+          </p:cNvPr>
+          <p:cNvGrpSpPr/>
+          <p:nvPr/>
+        </p:nvGrpSpPr>
+        <p:grpSpPr>
+          <a:xfrm>
+            <a:off x="478920" y="2904454"/>
+            <a:ext cx="1455812" cy="1237441"/>
+            <a:chOff x="296789" y="1567306"/>
+            <a:chExt cx="1455812" cy="1237441"/>
+          </a:xfrm>
+        </p:grpSpPr>
+        <p:pic>
+          <p:nvPicPr>
+            <p:cNvPr id="60" name="Picture 59" descr="Icon&#10;&#10;Description automatically generated">
+              <a:extLst>
+                <a:ext uri="{FF2B5EF4-FFF2-40B4-BE49-F238E27FC236}">
+                  <a16:creationId xmlns:a16="http://schemas.microsoft.com/office/drawing/2014/main" id="{29AD2BE9-1279-24BB-20D6-BF1001D08D5D}"/>
+                </a:ext>
+              </a:extLst>
+            </p:cNvPr>
+            <p:cNvPicPr>
+              <a:picLocks noChangeAspect="1"/>
+            </p:cNvPicPr>
+            <p:nvPr/>
+          </p:nvPicPr>
+          <p:blipFill>
+            <a:blip r:embed="rId2" cstate="email">
+              <a:extLst>
+                <a:ext uri="{28A0092B-C50C-407E-A947-70E740481C1C}">
+                  <a14:useLocalDpi xmlns:a14="http://schemas.microsoft.com/office/drawing/2010/main" val="0"/>
+                </a:ext>
+              </a:extLst>
+            </a:blip>
+            <a:stretch>
+              <a:fillRect/>
+            </a:stretch>
+          </p:blipFill>
+          <p:spPr>
+            <a:xfrm>
+              <a:off x="296789" y="1567306"/>
+              <a:ext cx="1455812" cy="1237441"/>
+            </a:xfrm>
+            <a:prstGeom prst="rect">
+              <a:avLst/>
+            </a:prstGeom>
+          </p:spPr>
+        </p:pic>
+        <p:sp>
+          <p:nvSpPr>
+            <p:cNvPr id="61" name="TextBox 60">
+              <a:extLst>
+                <a:ext uri="{FF2B5EF4-FFF2-40B4-BE49-F238E27FC236}">
+                  <a16:creationId xmlns:a16="http://schemas.microsoft.com/office/drawing/2014/main" id="{2AF7AAF2-E2A2-DCA8-53B1-FC193BB15E9C}"/>
+                </a:ext>
+              </a:extLst>
+            </p:cNvPr>
+            <p:cNvSpPr txBox="1"/>
+            <p:nvPr/>
+          </p:nvSpPr>
+          <p:spPr>
+            <a:xfrm>
+              <a:off x="526898" y="1809503"/>
+              <a:ext cx="1219200" cy="646331"/>
+            </a:xfrm>
+            <a:prstGeom prst="rect">
+              <a:avLst/>
+            </a:prstGeom>
+            <a:noFill/>
+          </p:spPr>
+          <p:txBody>
+            <a:bodyPr wrap="square" rtlCol="0">
+              <a:spAutoFit/>
+            </a:bodyPr>
+            <a:lstStyle/>
+            <a:p>
+              <a:r>
+                <a:rPr lang="en-US" sz="1200" i="1" dirty="0"/>
+                <a:t>“I can’t accomplish my goals.”</a:t>
+              </a:r>
+            </a:p>
+          </p:txBody>
+        </p:sp>
+      </p:grpSp>
+      <p:grpSp>
+        <p:nvGrpSpPr>
+          <p:cNvPr id="115" name="Group 114">
+            <a:extLst>
+              <a:ext uri="{FF2B5EF4-FFF2-40B4-BE49-F238E27FC236}">
+                <a16:creationId xmlns:a16="http://schemas.microsoft.com/office/drawing/2014/main" id="{26857CE5-B4C4-6EFA-C6DD-7A45A6A9CF0F}"/>
+              </a:ext>
+            </a:extLst>
+          </p:cNvPr>
+          <p:cNvGrpSpPr/>
+          <p:nvPr/>
+        </p:nvGrpSpPr>
+        <p:grpSpPr>
+          <a:xfrm>
+            <a:off x="6938045" y="1647507"/>
+            <a:ext cx="1654585" cy="945522"/>
+            <a:chOff x="6932893" y="1458100"/>
+            <a:chExt cx="1654585" cy="945522"/>
+          </a:xfrm>
+        </p:grpSpPr>
+        <p:pic>
+          <p:nvPicPr>
+            <p:cNvPr id="63" name="Picture 62" descr="A picture containing text&#10;&#10;Description automatically generated">
+              <a:extLst>
+                <a:ext uri="{FF2B5EF4-FFF2-40B4-BE49-F238E27FC236}">
+                  <a16:creationId xmlns:a16="http://schemas.microsoft.com/office/drawing/2014/main" id="{82D4099A-8B6E-1AA4-A2B8-3961D4CE373D}"/>
+                </a:ext>
+              </a:extLst>
+            </p:cNvPr>
+            <p:cNvPicPr>
+              <a:picLocks noChangeAspect="1"/>
+            </p:cNvPicPr>
+            <p:nvPr/>
+          </p:nvPicPr>
+          <p:blipFill>
+            <a:blip r:embed="rId9" cstate="email">
+              <a:extLst>
+                <a:ext uri="{28A0092B-C50C-407E-A947-70E740481C1C}">
+                  <a14:useLocalDpi xmlns:a14="http://schemas.microsoft.com/office/drawing/2010/main" val="0"/>
+                </a:ext>
+              </a:extLst>
+            </a:blip>
+            <a:stretch>
+              <a:fillRect/>
+            </a:stretch>
+          </p:blipFill>
+          <p:spPr>
+            <a:xfrm>
+              <a:off x="8149048" y="1860579"/>
+              <a:ext cx="438430" cy="518809"/>
+            </a:xfrm>
+            <a:prstGeom prst="rect">
+              <a:avLst/>
+            </a:prstGeom>
+          </p:spPr>
+        </p:pic>
+        <p:pic>
+          <p:nvPicPr>
+            <p:cNvPr id="65" name="Picture 64" descr="A picture containing text&#10;&#10;Description automatically generated">
+              <a:extLst>
+                <a:ext uri="{FF2B5EF4-FFF2-40B4-BE49-F238E27FC236}">
+                  <a16:creationId xmlns:a16="http://schemas.microsoft.com/office/drawing/2014/main" id="{67E4E593-9627-5E4E-79C5-34148796B818}"/>
+                </a:ext>
+              </a:extLst>
+            </p:cNvPr>
+            <p:cNvPicPr>
+              <a:picLocks noChangeAspect="1"/>
+            </p:cNvPicPr>
+            <p:nvPr/>
+          </p:nvPicPr>
+          <p:blipFill>
+            <a:blip r:embed="rId9" cstate="email">
+              <a:extLst>
+                <a:ext uri="{28A0092B-C50C-407E-A947-70E740481C1C}">
+                  <a14:useLocalDpi xmlns:a14="http://schemas.microsoft.com/office/drawing/2010/main" val="0"/>
+                </a:ext>
+              </a:extLst>
+            </a:blip>
+            <a:stretch>
+              <a:fillRect/>
+            </a:stretch>
+          </p:blipFill>
+          <p:spPr>
+            <a:xfrm>
+              <a:off x="7538389" y="1860579"/>
+              <a:ext cx="438430" cy="518809"/>
+            </a:xfrm>
+            <a:prstGeom prst="rect">
+              <a:avLst/>
+            </a:prstGeom>
+          </p:spPr>
+        </p:pic>
+        <p:pic>
+          <p:nvPicPr>
+            <p:cNvPr id="66" name="Picture 65" descr="A picture containing text, light&#10;&#10;Description automatically generated">
+              <a:extLst>
+                <a:ext uri="{FF2B5EF4-FFF2-40B4-BE49-F238E27FC236}">
+                  <a16:creationId xmlns:a16="http://schemas.microsoft.com/office/drawing/2014/main" id="{7F409751-80E8-37A9-B6ED-3DC111A79FD1}"/>
+                </a:ext>
+              </a:extLst>
+            </p:cNvPr>
+            <p:cNvPicPr>
+              <a:picLocks noChangeAspect="1"/>
+            </p:cNvPicPr>
+            <p:nvPr/>
+          </p:nvPicPr>
+          <p:blipFill>
+            <a:blip r:embed="rId10" cstate="email">
+              <a:extLst>
+                <a:ext uri="{28A0092B-C50C-407E-A947-70E740481C1C}">
+                  <a14:useLocalDpi xmlns:a14="http://schemas.microsoft.com/office/drawing/2010/main" val="0"/>
+                </a:ext>
+              </a:extLst>
+            </a:blip>
+            <a:stretch>
+              <a:fillRect/>
+            </a:stretch>
+          </p:blipFill>
+          <p:spPr>
+            <a:xfrm>
+              <a:off x="6932893" y="1884812"/>
+              <a:ext cx="438431" cy="518810"/>
+            </a:xfrm>
+            <a:prstGeom prst="rect">
+              <a:avLst/>
+            </a:prstGeom>
+          </p:spPr>
+        </p:pic>
+        <p:sp>
+          <p:nvSpPr>
+            <p:cNvPr id="76" name="TextBox 75">
+              <a:extLst>
+                <a:ext uri="{FF2B5EF4-FFF2-40B4-BE49-F238E27FC236}">
+                  <a16:creationId xmlns:a16="http://schemas.microsoft.com/office/drawing/2014/main" id="{AAF75DFE-2C38-A78F-706D-D0478E2492F8}"/>
+                </a:ext>
+              </a:extLst>
+            </p:cNvPr>
+            <p:cNvSpPr txBox="1"/>
+            <p:nvPr/>
+          </p:nvSpPr>
+          <p:spPr>
+            <a:xfrm>
+              <a:off x="6932893" y="1458100"/>
+              <a:ext cx="1372908" cy="276999"/>
+            </a:xfrm>
+            <a:prstGeom prst="rect">
+              <a:avLst/>
+            </a:prstGeom>
+            <a:noFill/>
+          </p:spPr>
+          <p:txBody>
+            <a:bodyPr wrap="square" rtlCol="0">
+              <a:spAutoFit/>
+            </a:bodyPr>
+            <a:lstStyle/>
+            <a:p>
+              <a:r>
+                <a:rPr lang="en-US" sz="1200" i="1" dirty="0"/>
+                <a:t>Classify by schema</a:t>
+              </a:r>
+            </a:p>
+          </p:txBody>
+        </p:sp>
+      </p:grpSp>
+      <p:grpSp>
+        <p:nvGrpSpPr>
+          <p:cNvPr id="107" name="Group 106">
+            <a:extLst>
+              <a:ext uri="{FF2B5EF4-FFF2-40B4-BE49-F238E27FC236}">
+                <a16:creationId xmlns:a16="http://schemas.microsoft.com/office/drawing/2014/main" id="{24D9937C-4CB2-ACEA-6496-DD3111ABF89A}"/>
+              </a:ext>
+            </a:extLst>
+          </p:cNvPr>
+          <p:cNvGrpSpPr/>
+          <p:nvPr/>
+        </p:nvGrpSpPr>
+        <p:grpSpPr>
+          <a:xfrm>
+            <a:off x="6932893" y="3159101"/>
+            <a:ext cx="1967087" cy="1571534"/>
+            <a:chOff x="6932893" y="3042571"/>
+            <a:chExt cx="1967087" cy="1571534"/>
+          </a:xfrm>
+        </p:grpSpPr>
+        <p:pic>
+          <p:nvPicPr>
+            <p:cNvPr id="68" name="Picture 67" descr="Shape&#10;&#10;Description automatically generated with medium confidence">
+              <a:extLst>
+                <a:ext uri="{FF2B5EF4-FFF2-40B4-BE49-F238E27FC236}">
+                  <a16:creationId xmlns:a16="http://schemas.microsoft.com/office/drawing/2014/main" id="{BD4D3781-4C94-CA6E-FF24-43D7351972C4}"/>
+                </a:ext>
+              </a:extLst>
+            </p:cNvPr>
+            <p:cNvPicPr>
+              <a:picLocks noChangeAspect="1"/>
+            </p:cNvPicPr>
+            <p:nvPr/>
+          </p:nvPicPr>
+          <p:blipFill>
+            <a:blip r:embed="rId11">
+              <a:extLst>
+                <a:ext uri="{28A0092B-C50C-407E-A947-70E740481C1C}">
+                  <a14:useLocalDpi xmlns:a14="http://schemas.microsoft.com/office/drawing/2010/main" val="0"/>
+                </a:ext>
+              </a:extLst>
+            </a:blip>
+            <a:stretch>
+              <a:fillRect/>
+            </a:stretch>
+          </p:blipFill>
+          <p:spPr>
+            <a:xfrm>
+              <a:off x="7665247" y="3504224"/>
+              <a:ext cx="761905" cy="901587"/>
+            </a:xfrm>
+            <a:prstGeom prst="rect">
+              <a:avLst/>
+            </a:prstGeom>
+          </p:spPr>
+        </p:pic>
+        <p:pic>
+          <p:nvPicPr>
+            <p:cNvPr id="74" name="Picture 73" descr="A picture containing text, clock&#10;&#10;Description automatically generated">
+              <a:extLst>
+                <a:ext uri="{FF2B5EF4-FFF2-40B4-BE49-F238E27FC236}">
+                  <a16:creationId xmlns:a16="http://schemas.microsoft.com/office/drawing/2014/main" id="{D1B255DC-2616-021F-D931-191750940CA2}"/>
+                </a:ext>
+              </a:extLst>
+            </p:cNvPr>
+            <p:cNvPicPr>
+              <a:picLocks noChangeAspect="1"/>
+            </p:cNvPicPr>
+            <p:nvPr/>
+          </p:nvPicPr>
+          <p:blipFill>
+            <a:blip r:embed="rId12" cstate="email">
+              <a:extLst>
+                <a:ext uri="{28A0092B-C50C-407E-A947-70E740481C1C}">
+                  <a14:useLocalDpi xmlns:a14="http://schemas.microsoft.com/office/drawing/2010/main" val="0"/>
+                </a:ext>
+              </a:extLst>
+            </a:blip>
+            <a:stretch>
+              <a:fillRect/>
+            </a:stretch>
+          </p:blipFill>
+          <p:spPr>
+            <a:xfrm>
+              <a:off x="7031003" y="3302932"/>
+              <a:ext cx="521923" cy="1311173"/>
+            </a:xfrm>
+            <a:prstGeom prst="rect">
+              <a:avLst/>
+            </a:prstGeom>
+          </p:spPr>
+        </p:pic>
+        <p:sp>
+          <p:nvSpPr>
+            <p:cNvPr id="77" name="TextBox 76">
+              <a:extLst>
+                <a:ext uri="{FF2B5EF4-FFF2-40B4-BE49-F238E27FC236}">
+                  <a16:creationId xmlns:a16="http://schemas.microsoft.com/office/drawing/2014/main" id="{92A45CE5-9EA0-63BC-6CDB-F266C9C9C6B2}"/>
+                </a:ext>
+              </a:extLst>
+            </p:cNvPr>
+            <p:cNvSpPr txBox="1"/>
+            <p:nvPr/>
+          </p:nvSpPr>
+          <p:spPr>
+            <a:xfrm>
+              <a:off x="6932893" y="3042571"/>
+              <a:ext cx="1967087" cy="276999"/>
+            </a:xfrm>
+            <a:prstGeom prst="rect">
+              <a:avLst/>
+            </a:prstGeom>
+            <a:noFill/>
+          </p:spPr>
+          <p:txBody>
+            <a:bodyPr wrap="square" rtlCol="0">
+              <a:spAutoFit/>
+            </a:bodyPr>
+            <a:lstStyle/>
+            <a:p>
+              <a:r>
+                <a:rPr lang="en-US" sz="1200" i="1" dirty="0"/>
+                <a:t>Predict single schema rating</a:t>
+              </a:r>
+            </a:p>
+          </p:txBody>
+        </p:sp>
+      </p:grpSp>
+      <p:sp>
+        <p:nvSpPr>
+          <p:cNvPr id="86" name="Arrow: Right 85">
+            <a:extLst>
+              <a:ext uri="{FF2B5EF4-FFF2-40B4-BE49-F238E27FC236}">
+                <a16:creationId xmlns:a16="http://schemas.microsoft.com/office/drawing/2014/main" id="{627AC5CA-2976-6A79-956E-21F5EA2A4707}"/>
+              </a:ext>
+            </a:extLst>
+          </p:cNvPr>
+          <p:cNvSpPr/>
+          <p:nvPr/>
+        </p:nvSpPr>
+        <p:spPr>
+          <a:xfrm rot="20005599">
+            <a:off x="1914508" y="3051978"/>
+            <a:ext cx="441718" cy="156319"/>
+          </a:xfrm>
+          <a:prstGeom prst="rightArrow">
+            <a:avLst/>
+          </a:prstGeom>
+        </p:spPr>
+        <p:style>
+          <a:lnRef idx="1">
+            <a:schemeClr val="accent5"/>
+          </a:lnRef>
+          <a:fillRef idx="1003">
+            <a:schemeClr val="lt1"/>
+          </a:fillRef>
+          <a:effectRef idx="1">
+            <a:schemeClr val="accent5"/>
+          </a:effectRef>
+          <a:fontRef idx="minor">
+            <a:schemeClr val="dk1"/>
+          </a:fontRef>
+        </p:style>
+        <p:txBody>
+          <a:bodyPr rtlCol="0" anchor="ctr"/>
+          <a:lstStyle/>
+          <a:p>
+            <a:pPr algn="ctr"/>
+            <a:endParaRPr lang="en-US"/>
+          </a:p>
+        </p:txBody>
+      </p:sp>
+      <p:sp>
+        <p:nvSpPr>
+          <p:cNvPr id="92" name="TextBox 91">
+            <a:extLst>
+              <a:ext uri="{FF2B5EF4-FFF2-40B4-BE49-F238E27FC236}">
+                <a16:creationId xmlns:a16="http://schemas.microsoft.com/office/drawing/2014/main" id="{91252A97-D5E3-484B-2B50-5C6BFF7F9041}"/>
+              </a:ext>
+            </a:extLst>
+          </p:cNvPr>
+          <p:cNvSpPr txBox="1"/>
+          <p:nvPr/>
+        </p:nvSpPr>
+        <p:spPr>
+          <a:xfrm>
+            <a:off x="2093575" y="970533"/>
+            <a:ext cx="1248933" cy="369332"/>
+          </a:xfrm>
+          <a:prstGeom prst="rect">
+            <a:avLst/>
+          </a:prstGeom>
+          <a:noFill/>
+        </p:spPr>
+        <p:txBody>
+          <a:bodyPr wrap="square" rtlCol="0">
+            <a:spAutoFit/>
+          </a:bodyPr>
+          <a:lstStyle/>
+          <a:p>
+            <a:r>
+              <a:rPr lang="en-US" u="sng" dirty="0"/>
+              <a:t>Embedding</a:t>
+            </a:r>
+          </a:p>
+        </p:txBody>
+      </p:sp>
+      <p:sp>
+        <p:nvSpPr>
+          <p:cNvPr id="97" name="Arrow: Right 96">
+            <a:extLst>
+              <a:ext uri="{FF2B5EF4-FFF2-40B4-BE49-F238E27FC236}">
+                <a16:creationId xmlns:a16="http://schemas.microsoft.com/office/drawing/2014/main" id="{5EFC45D7-31BD-AEE1-1DE7-EE62DD9DB4A7}"/>
+              </a:ext>
+            </a:extLst>
+          </p:cNvPr>
+          <p:cNvSpPr/>
+          <p:nvPr/>
+        </p:nvSpPr>
+        <p:spPr>
+          <a:xfrm rot="766590">
+            <a:off x="1818229" y="2567099"/>
+            <a:ext cx="441718" cy="156319"/>
+          </a:xfrm>
+          <a:prstGeom prst="rightArrow">
+            <a:avLst/>
+          </a:prstGeom>
+        </p:spPr>
+        <p:style>
+          <a:lnRef idx="1">
+            <a:schemeClr val="accent5"/>
+          </a:lnRef>
+          <a:fillRef idx="1003">
+            <a:schemeClr val="lt1"/>
+          </a:fillRef>
+          <a:effectRef idx="1">
+            <a:schemeClr val="accent5"/>
+          </a:effectRef>
+          <a:fontRef idx="minor">
+            <a:schemeClr val="dk1"/>
+          </a:fontRef>
+        </p:style>
+        <p:txBody>
+          <a:bodyPr rtlCol="0" anchor="ctr"/>
+          <a:lstStyle/>
+          <a:p>
+            <a:pPr algn="ctr"/>
+            <a:endParaRPr lang="en-US"/>
+          </a:p>
+        </p:txBody>
+      </p:sp>
+      <p:sp>
+        <p:nvSpPr>
+          <p:cNvPr id="98" name="Arrow: Right 97">
+            <a:extLst>
+              <a:ext uri="{FF2B5EF4-FFF2-40B4-BE49-F238E27FC236}">
+                <a16:creationId xmlns:a16="http://schemas.microsoft.com/office/drawing/2014/main" id="{419105E2-8698-B415-0361-9F028BCC1FB9}"/>
+              </a:ext>
+            </a:extLst>
+          </p:cNvPr>
+          <p:cNvSpPr/>
+          <p:nvPr/>
+        </p:nvSpPr>
+        <p:spPr>
+          <a:xfrm rot="20005599">
+            <a:off x="3221701" y="2571042"/>
+            <a:ext cx="441718" cy="156319"/>
+          </a:xfrm>
+          <a:prstGeom prst="rightArrow">
+            <a:avLst/>
+          </a:prstGeom>
+        </p:spPr>
+        <p:style>
+          <a:lnRef idx="1">
+            <a:schemeClr val="accent5"/>
+          </a:lnRef>
+          <a:fillRef idx="1003">
+            <a:schemeClr val="lt1"/>
+          </a:fillRef>
+          <a:effectRef idx="1">
+            <a:schemeClr val="accent5"/>
+          </a:effectRef>
+          <a:fontRef idx="minor">
+            <a:schemeClr val="dk1"/>
+          </a:fontRef>
+        </p:style>
+        <p:txBody>
+          <a:bodyPr rtlCol="0" anchor="ctr"/>
+          <a:lstStyle/>
+          <a:p>
+            <a:pPr algn="ctr"/>
+            <a:endParaRPr lang="en-US"/>
+          </a:p>
+        </p:txBody>
+      </p:sp>
+      <p:sp>
+        <p:nvSpPr>
+          <p:cNvPr id="99" name="Arrow: Right 98">
+            <a:extLst>
+              <a:ext uri="{FF2B5EF4-FFF2-40B4-BE49-F238E27FC236}">
+                <a16:creationId xmlns:a16="http://schemas.microsoft.com/office/drawing/2014/main" id="{C94936E1-02E6-1AF5-628E-B88C1DCEA88A}"/>
+              </a:ext>
+            </a:extLst>
+          </p:cNvPr>
+          <p:cNvSpPr/>
+          <p:nvPr/>
+        </p:nvSpPr>
+        <p:spPr>
+          <a:xfrm rot="2305442">
+            <a:off x="3149691" y="3266983"/>
+            <a:ext cx="441718" cy="156319"/>
+          </a:xfrm>
+          <a:prstGeom prst="rightArrow">
+            <a:avLst/>
+          </a:prstGeom>
+        </p:spPr>
+        <p:style>
+          <a:lnRef idx="1">
+            <a:schemeClr val="accent5"/>
+          </a:lnRef>
+          <a:fillRef idx="1003">
+            <a:schemeClr val="lt1"/>
+          </a:fillRef>
+          <a:effectRef idx="1">
+            <a:schemeClr val="accent5"/>
+          </a:effectRef>
+          <a:fontRef idx="minor">
+            <a:schemeClr val="dk1"/>
+          </a:fontRef>
+        </p:style>
+        <p:txBody>
+          <a:bodyPr rtlCol="0" anchor="ctr"/>
+          <a:lstStyle/>
+          <a:p>
+            <a:pPr algn="ctr"/>
+            <a:endParaRPr lang="en-US"/>
+          </a:p>
+        </p:txBody>
+      </p:sp>
+      <p:sp>
+        <p:nvSpPr>
+          <p:cNvPr id="100" name="Arrow: Right 99">
+            <a:extLst>
+              <a:ext uri="{FF2B5EF4-FFF2-40B4-BE49-F238E27FC236}">
+                <a16:creationId xmlns:a16="http://schemas.microsoft.com/office/drawing/2014/main" id="{83B64B2E-B6CD-9B45-E4D8-EA40F2D373C7}"/>
+              </a:ext>
+            </a:extLst>
+          </p:cNvPr>
+          <p:cNvSpPr/>
+          <p:nvPr/>
+        </p:nvSpPr>
+        <p:spPr>
+          <a:xfrm rot="20005599">
+            <a:off x="4832207" y="2013592"/>
+            <a:ext cx="441718" cy="156319"/>
+          </a:xfrm>
+          <a:prstGeom prst="rightArrow">
+            <a:avLst/>
+          </a:prstGeom>
+        </p:spPr>
+        <p:style>
+          <a:lnRef idx="1">
+            <a:schemeClr val="accent5"/>
+          </a:lnRef>
+          <a:fillRef idx="1003">
+            <a:schemeClr val="lt1"/>
+          </a:fillRef>
+          <a:effectRef idx="1">
+            <a:schemeClr val="accent5"/>
+          </a:effectRef>
+          <a:fontRef idx="minor">
+            <a:schemeClr val="dk1"/>
+          </a:fontRef>
+        </p:style>
+        <p:txBody>
+          <a:bodyPr rtlCol="0" anchor="ctr"/>
+          <a:lstStyle/>
+          <a:p>
+            <a:pPr algn="ctr"/>
+            <a:endParaRPr lang="en-US"/>
+          </a:p>
+        </p:txBody>
+      </p:sp>
+      <p:sp>
+        <p:nvSpPr>
+          <p:cNvPr id="101" name="Arrow: Right 100">
+            <a:extLst>
+              <a:ext uri="{FF2B5EF4-FFF2-40B4-BE49-F238E27FC236}">
+                <a16:creationId xmlns:a16="http://schemas.microsoft.com/office/drawing/2014/main" id="{CA7513EC-75E9-FC74-3A43-E827A1B1963A}"/>
+              </a:ext>
+            </a:extLst>
+          </p:cNvPr>
+          <p:cNvSpPr/>
+          <p:nvPr/>
+        </p:nvSpPr>
+        <p:spPr>
+          <a:xfrm rot="1312441">
+            <a:off x="4822606" y="2574296"/>
+            <a:ext cx="441718" cy="156319"/>
+          </a:xfrm>
+          <a:prstGeom prst="rightArrow">
+            <a:avLst/>
+          </a:prstGeom>
+        </p:spPr>
+        <p:style>
+          <a:lnRef idx="1">
+            <a:schemeClr val="accent5"/>
+          </a:lnRef>
+          <a:fillRef idx="1003">
+            <a:schemeClr val="lt1"/>
+          </a:fillRef>
+          <a:effectRef idx="1">
+            <a:schemeClr val="accent5"/>
+          </a:effectRef>
+          <a:fontRef idx="minor">
+            <a:schemeClr val="dk1"/>
+          </a:fontRef>
+        </p:style>
+        <p:txBody>
+          <a:bodyPr rtlCol="0" anchor="ctr"/>
+          <a:lstStyle/>
+          <a:p>
+            <a:pPr algn="ctr"/>
+            <a:endParaRPr lang="en-US"/>
+          </a:p>
+        </p:txBody>
+      </p:sp>
+      <p:sp>
+        <p:nvSpPr>
+          <p:cNvPr id="102" name="Arrow: Right 101">
+            <a:extLst>
+              <a:ext uri="{FF2B5EF4-FFF2-40B4-BE49-F238E27FC236}">
+                <a16:creationId xmlns:a16="http://schemas.microsoft.com/office/drawing/2014/main" id="{4F9AB0FB-CC33-BA17-2AD1-6E122FD38988}"/>
+              </a:ext>
+            </a:extLst>
+          </p:cNvPr>
+          <p:cNvSpPr/>
+          <p:nvPr/>
+        </p:nvSpPr>
+        <p:spPr>
+          <a:xfrm>
+            <a:off x="4928751" y="3845865"/>
+            <a:ext cx="441718" cy="156319"/>
+          </a:xfrm>
+          <a:prstGeom prst="rightArrow">
+            <a:avLst/>
+          </a:prstGeom>
+        </p:spPr>
+        <p:style>
+          <a:lnRef idx="1">
+            <a:schemeClr val="accent5"/>
+          </a:lnRef>
+          <a:fillRef idx="1003">
+            <a:schemeClr val="lt1"/>
+          </a:fillRef>
+          <a:effectRef idx="1">
+            <a:schemeClr val="accent5"/>
+          </a:effectRef>
+          <a:fontRef idx="minor">
+            <a:schemeClr val="dk1"/>
+          </a:fontRef>
+        </p:style>
+        <p:txBody>
+          <a:bodyPr rtlCol="0" anchor="ctr"/>
+          <a:lstStyle/>
+          <a:p>
+            <a:pPr algn="ctr"/>
+            <a:endParaRPr lang="en-US"/>
+          </a:p>
+        </p:txBody>
+      </p:sp>
+      <p:sp>
+        <p:nvSpPr>
+          <p:cNvPr id="103" name="Arrow: Right 102">
+            <a:extLst>
+              <a:ext uri="{FF2B5EF4-FFF2-40B4-BE49-F238E27FC236}">
+                <a16:creationId xmlns:a16="http://schemas.microsoft.com/office/drawing/2014/main" id="{DFB6ABF7-CA22-6342-C06C-09604A5C3713}"/>
+              </a:ext>
+            </a:extLst>
+          </p:cNvPr>
+          <p:cNvSpPr/>
+          <p:nvPr/>
+        </p:nvSpPr>
+        <p:spPr>
+          <a:xfrm rot="1328851">
+            <a:off x="6393430" y="1937698"/>
+            <a:ext cx="441718" cy="156319"/>
+          </a:xfrm>
+          <a:prstGeom prst="rightArrow">
+            <a:avLst/>
+          </a:prstGeom>
+        </p:spPr>
+        <p:style>
+          <a:lnRef idx="1">
+            <a:schemeClr val="accent5"/>
+          </a:lnRef>
+          <a:fillRef idx="1003">
+            <a:schemeClr val="lt1"/>
+          </a:fillRef>
+          <a:effectRef idx="1">
+            <a:schemeClr val="accent5"/>
+          </a:effectRef>
+          <a:fontRef idx="minor">
+            <a:schemeClr val="dk1"/>
+          </a:fontRef>
+        </p:style>
+        <p:txBody>
+          <a:bodyPr rtlCol="0" anchor="ctr"/>
+          <a:lstStyle/>
+          <a:p>
+            <a:pPr algn="ctr"/>
+            <a:endParaRPr lang="en-US"/>
+          </a:p>
+        </p:txBody>
+      </p:sp>
+      <p:sp>
+        <p:nvSpPr>
+          <p:cNvPr id="104" name="Arrow: Right 103">
+            <a:extLst>
+              <a:ext uri="{FF2B5EF4-FFF2-40B4-BE49-F238E27FC236}">
+                <a16:creationId xmlns:a16="http://schemas.microsoft.com/office/drawing/2014/main" id="{6528B33B-4DD0-69A0-89CC-47456F9F2E2B}"/>
+              </a:ext>
+            </a:extLst>
+          </p:cNvPr>
+          <p:cNvSpPr/>
+          <p:nvPr/>
+        </p:nvSpPr>
+        <p:spPr>
+          <a:xfrm rot="20005599">
+            <a:off x="6479695" y="2492217"/>
+            <a:ext cx="365760" cy="156319"/>
+          </a:xfrm>
+          <a:prstGeom prst="rightArrow">
+            <a:avLst/>
+          </a:prstGeom>
+        </p:spPr>
+        <p:style>
+          <a:lnRef idx="1">
+            <a:schemeClr val="accent5"/>
+          </a:lnRef>
+          <a:fillRef idx="1003">
+            <a:schemeClr val="lt1"/>
+          </a:fillRef>
+          <a:effectRef idx="1">
+            <a:schemeClr val="accent5"/>
+          </a:effectRef>
+          <a:fontRef idx="minor">
+            <a:schemeClr val="dk1"/>
+          </a:fontRef>
+        </p:style>
+        <p:txBody>
+          <a:bodyPr rtlCol="0" anchor="ctr"/>
+          <a:lstStyle/>
+          <a:p>
+            <a:pPr algn="ctr"/>
+            <a:endParaRPr lang="en-US"/>
+          </a:p>
+        </p:txBody>
+      </p:sp>
+      <p:sp>
+        <p:nvSpPr>
+          <p:cNvPr id="105" name="Arrow: Right 104">
+            <a:extLst>
+              <a:ext uri="{FF2B5EF4-FFF2-40B4-BE49-F238E27FC236}">
+                <a16:creationId xmlns:a16="http://schemas.microsoft.com/office/drawing/2014/main" id="{3C86F16A-5BA9-94EF-1175-994452577E6A}"/>
+              </a:ext>
+            </a:extLst>
+          </p:cNvPr>
+          <p:cNvSpPr/>
+          <p:nvPr/>
+        </p:nvSpPr>
+        <p:spPr>
+          <a:xfrm rot="19082050">
+            <a:off x="6200181" y="3103040"/>
+            <a:ext cx="1084008" cy="155448"/>
+          </a:xfrm>
+          <a:prstGeom prst="rightArrow">
+            <a:avLst/>
+          </a:prstGeom>
+        </p:spPr>
+        <p:style>
+          <a:lnRef idx="1">
+            <a:schemeClr val="accent5"/>
+          </a:lnRef>
+          <a:fillRef idx="1003">
+            <a:schemeClr val="lt1"/>
+          </a:fillRef>
+          <a:effectRef idx="1">
+            <a:schemeClr val="accent5"/>
+          </a:effectRef>
+          <a:fontRef idx="minor">
+            <a:schemeClr val="dk1"/>
+          </a:fontRef>
+        </p:style>
+        <p:txBody>
+          <a:bodyPr rtlCol="0" anchor="ctr"/>
+          <a:lstStyle/>
+          <a:p>
+            <a:pPr algn="ctr"/>
+            <a:endParaRPr lang="en-US"/>
+          </a:p>
+        </p:txBody>
+      </p:sp>
+      <p:sp>
+        <p:nvSpPr>
+          <p:cNvPr id="106" name="Arrow: Right 105">
+            <a:extLst>
+              <a:ext uri="{FF2B5EF4-FFF2-40B4-BE49-F238E27FC236}">
+                <a16:creationId xmlns:a16="http://schemas.microsoft.com/office/drawing/2014/main" id="{DBDE8438-6E96-E11C-7793-CFC00C84127D}"/>
+              </a:ext>
+            </a:extLst>
+          </p:cNvPr>
+          <p:cNvSpPr/>
+          <p:nvPr/>
+        </p:nvSpPr>
+        <p:spPr>
+          <a:xfrm>
+            <a:off x="6419382" y="3920836"/>
+            <a:ext cx="530352" cy="156319"/>
+          </a:xfrm>
+          <a:prstGeom prst="rightArrow">
+            <a:avLst/>
+          </a:prstGeom>
+        </p:spPr>
+        <p:style>
+          <a:lnRef idx="1">
+            <a:schemeClr val="accent5"/>
+          </a:lnRef>
+          <a:fillRef idx="1003">
+            <a:schemeClr val="lt1"/>
+          </a:fillRef>
+          <a:effectRef idx="1">
+            <a:schemeClr val="accent5"/>
+          </a:effectRef>
+          <a:fontRef idx="minor">
+            <a:schemeClr val="dk1"/>
+          </a:fontRef>
+        </p:style>
+        <p:txBody>
+          <a:bodyPr rtlCol="0" anchor="ctr"/>
+          <a:lstStyle/>
+          <a:p>
+            <a:pPr algn="ctr"/>
+            <a:endParaRPr lang="en-US"/>
+          </a:p>
+        </p:txBody>
+      </p:sp>
+      <p:cxnSp>
+        <p:nvCxnSpPr>
+          <p:cNvPr id="109" name="Straight Connector 108">
+            <a:extLst>
+              <a:ext uri="{FF2B5EF4-FFF2-40B4-BE49-F238E27FC236}">
+                <a16:creationId xmlns:a16="http://schemas.microsoft.com/office/drawing/2014/main" id="{765FC436-D863-8D0E-F9A7-96F64F97B402}"/>
+              </a:ext>
+            </a:extLst>
+          </p:cNvPr>
+          <p:cNvCxnSpPr>
+            <a:cxnSpLocks/>
+          </p:cNvCxnSpPr>
+          <p:nvPr/>
+        </p:nvCxnSpPr>
+        <p:spPr>
+          <a:xfrm>
+            <a:off x="5277543" y="2212411"/>
+            <a:ext cx="1102717" cy="0"/>
+          </a:xfrm>
+          <a:prstGeom prst="line">
+            <a:avLst/>
+          </a:prstGeom>
+          <a:ln w="9525" cap="flat" cmpd="sng" algn="ctr">
+            <a:solidFill>
+              <a:schemeClr val="accent5"/>
+            </a:solidFill>
+            <a:prstDash val="dash"/>
+            <a:round/>
+            <a:headEnd type="none" w="med" len="med"/>
+            <a:tailEnd type="none" w="med" len="med"/>
+          </a:ln>
+        </p:spPr>
+        <p:style>
+          <a:lnRef idx="0">
+            <a:scrgbClr r="0" g="0" b="0"/>
+          </a:lnRef>
+          <a:fillRef idx="0">
+            <a:scrgbClr r="0" g="0" b="0"/>
+          </a:fillRef>
+          <a:effectRef idx="0">
+            <a:scrgbClr r="0" g="0" b="0"/>
+          </a:effectRef>
+          <a:fontRef idx="minor">
+            <a:schemeClr val="tx1"/>
+          </a:fontRef>
+        </p:style>
+      </p:cxnSp>
+      <p:cxnSp>
+        <p:nvCxnSpPr>
+          <p:cNvPr id="110" name="Straight Connector 109">
+            <a:extLst>
+              <a:ext uri="{FF2B5EF4-FFF2-40B4-BE49-F238E27FC236}">
+                <a16:creationId xmlns:a16="http://schemas.microsoft.com/office/drawing/2014/main" id="{8E3F0323-BFC3-02DC-B6B7-980FAF6EBF9D}"/>
+              </a:ext>
+            </a:extLst>
+          </p:cNvPr>
+          <p:cNvCxnSpPr>
+            <a:cxnSpLocks/>
+          </p:cNvCxnSpPr>
+          <p:nvPr/>
+        </p:nvCxnSpPr>
+        <p:spPr>
+          <a:xfrm>
+            <a:off x="5277543" y="3440216"/>
+            <a:ext cx="1047058" cy="0"/>
+          </a:xfrm>
+          <a:prstGeom prst="line">
+            <a:avLst/>
+          </a:prstGeom>
+          <a:ln w="9525" cap="flat" cmpd="sng" algn="ctr">
+            <a:solidFill>
+              <a:schemeClr val="accent5"/>
+            </a:solidFill>
+            <a:prstDash val="dash"/>
+            <a:round/>
+            <a:headEnd type="none" w="med" len="med"/>
+            <a:tailEnd type="none" w="med" len="med"/>
+          </a:ln>
+        </p:spPr>
+        <p:style>
+          <a:lnRef idx="0">
+            <a:scrgbClr r="0" g="0" b="0"/>
+          </a:lnRef>
+          <a:fillRef idx="0">
+            <a:scrgbClr r="0" g="0" b="0"/>
+          </a:fillRef>
+          <a:effectRef idx="0">
+            <a:scrgbClr r="0" g="0" b="0"/>
+          </a:effectRef>
+          <a:fontRef idx="minor">
+            <a:schemeClr val="tx1"/>
+          </a:fontRef>
+        </p:style>
+      </p:cxnSp>
+      <p:cxnSp>
+        <p:nvCxnSpPr>
+          <p:cNvPr id="113" name="Straight Connector 112">
+            <a:extLst>
+              <a:ext uri="{FF2B5EF4-FFF2-40B4-BE49-F238E27FC236}">
+                <a16:creationId xmlns:a16="http://schemas.microsoft.com/office/drawing/2014/main" id="{8C3F9FD2-9439-4635-6EF8-C318A84B7460}"/>
+              </a:ext>
+            </a:extLst>
+          </p:cNvPr>
+          <p:cNvCxnSpPr>
+            <a:cxnSpLocks/>
+          </p:cNvCxnSpPr>
+          <p:nvPr/>
+        </p:nvCxnSpPr>
+        <p:spPr>
+          <a:xfrm>
+            <a:off x="7046331" y="3138376"/>
+            <a:ext cx="1716669" cy="0"/>
+          </a:xfrm>
+          <a:prstGeom prst="line">
+            <a:avLst/>
+          </a:prstGeom>
+          <a:ln w="9525" cap="flat" cmpd="sng" algn="ctr">
+            <a:solidFill>
+              <a:schemeClr val="accent5"/>
+            </a:solidFill>
+            <a:prstDash val="dash"/>
+            <a:round/>
+            <a:headEnd type="none" w="med" len="med"/>
+            <a:tailEnd type="none" w="med" len="med"/>
+          </a:ln>
+        </p:spPr>
+        <p:style>
+          <a:lnRef idx="0">
+            <a:scrgbClr r="0" g="0" b="0"/>
+          </a:lnRef>
+          <a:fillRef idx="0">
+            <a:scrgbClr r="0" g="0" b="0"/>
+          </a:fillRef>
+          <a:effectRef idx="0">
+            <a:scrgbClr r="0" g="0" b="0"/>
+          </a:effectRef>
+          <a:fontRef idx="minor">
+            <a:schemeClr val="tx1"/>
+          </a:fontRef>
+        </p:style>
+      </p:cxnSp>
+    </p:spTree>
+    <p:extLst>
+      <p:ext uri="{BB962C8B-B14F-4D97-AF65-F5344CB8AC3E}">
+        <p14:creationId xmlns:p14="http://schemas.microsoft.com/office/powerpoint/2010/main" val="2039002648"/>
+      </p:ext>
+    </p:extLst>
+  </p:cSld>
+  <p:clrMapOvr>
+    <a:masterClrMapping/>
+  </p:clrMapOvr>
+  <mc:AlternateContent xmlns:mc="http://schemas.openxmlformats.org/markup-compatibility/2006">
+    <mc:Choice xmlns:p14="http://schemas.microsoft.com/office/powerpoint/2010/main" Requires="p14">
+      <p:transition p14:dur="0"/>
+    </mc:Choice>
+    <mc:Fallback>
+      <p:transition/>
+    </mc:Fallback>
+  </mc:AlternateContent>
+</p:sld>
+</file>
+
+<file path=ppt/slides/slide6.xml><?xml version="1.0" encoding="utf-8"?>
+<p:sld xmlns:a="http://schemas.openxmlformats.org/drawingml/2006/main" xmlns:r="http://schemas.openxmlformats.org/officeDocument/2006/relationships" xmlns:p="http://schemas.openxmlformats.org/presentationml/2006/main">
+  <p:cSld>
+    <p:spTree>
+      <p:nvGrpSpPr>
+        <p:cNvPr id="1" name=""/>
+        <p:cNvGrpSpPr/>
+        <p:nvPr/>
+      </p:nvGrpSpPr>
+      <p:grpSpPr>
+        <a:xfrm>
+          <a:off x="0" y="0"/>
+          <a:ext cx="0" cy="0"/>
+          <a:chOff x="0" y="0"/>
+          <a:chExt cx="0" cy="0"/>
+        </a:xfrm>
+      </p:grpSpPr>
+      <p:sp>
+        <p:nvSpPr>
+          <p:cNvPr id="2" name="Title 1"/>
+          <p:cNvSpPr>
+            <a:spLocks noGrp="1"/>
+          </p:cNvSpPr>
+          <p:nvPr>
+            <p:ph type="title"/>
+          </p:nvPr>
+        </p:nvSpPr>
+        <p:spPr/>
+        <p:txBody>
+          <a:bodyPr/>
+          <a:lstStyle/>
+          <a:p>
+            <a:r>
+              <a:rPr lang="en-US" dirty="0"/>
+              <a:t>Scope of Reproducibility </a:t>
+            </a:r>
+          </a:p>
+        </p:txBody>
+      </p:sp>
+      <p:sp>
+        <p:nvSpPr>
+          <p:cNvPr id="3" name="Content Placeholder 2"/>
+          <p:cNvSpPr>
+            <a:spLocks noGrp="1"/>
+          </p:cNvSpPr>
+          <p:nvPr>
+            <p:ph idx="1"/>
+          </p:nvPr>
+        </p:nvSpPr>
+        <p:spPr>
+          <a:xfrm>
+            <a:off x="822960" y="1428750"/>
+            <a:ext cx="8077200" cy="3352800"/>
+          </a:xfrm>
+        </p:spPr>
+        <p:txBody>
+          <a:bodyPr>
+            <a:normAutofit/>
+          </a:bodyPr>
+          <a:lstStyle/>
+          <a:p>
+            <a:r>
+              <a:rPr lang="en-US" dirty="0"/>
+              <a:t>Burger et all trained 4 types of model </a:t>
+            </a:r>
+          </a:p>
+          <a:p>
+            <a:r>
+              <a:rPr lang="en-US" dirty="0"/>
+              <a:t>Attempt to recreate these</a:t>
+            </a:r>
+          </a:p>
+          <a:p>
+            <a:r>
+              <a:rPr lang="en-US" dirty="0"/>
+              <a:t>Use different python packages</a:t>
+            </a:r>
+          </a:p>
+          <a:p>
+            <a:r>
+              <a:rPr lang="en-US" dirty="0"/>
+              <a:t>Use different design choices with judgement</a:t>
+            </a:r>
+          </a:p>
+          <a:p>
+            <a:r>
+              <a:rPr lang="en-US" dirty="0"/>
+              <a:t>Test two additional hypothesis </a:t>
+            </a:r>
+          </a:p>
+          <a:p>
+            <a:pPr lvl="1"/>
+            <a:r>
+              <a:rPr lang="en-US" dirty="0"/>
+              <a:t>Lax preprocessing</a:t>
+            </a:r>
+          </a:p>
+          <a:p>
+            <a:pPr lvl="1"/>
+            <a:r>
+              <a:rPr lang="en-US" dirty="0"/>
+              <a:t>Scenario level utterances </a:t>
+            </a:r>
+          </a:p>
+          <a:p>
+            <a:endParaRPr lang="en-US" dirty="0"/>
+          </a:p>
+        </p:txBody>
+      </p:sp>
+    </p:spTree>
+    <p:extLst>
+      <p:ext uri="{BB962C8B-B14F-4D97-AF65-F5344CB8AC3E}">
+        <p14:creationId xmlns:p14="http://schemas.microsoft.com/office/powerpoint/2010/main" val="2890275294"/>
+      </p:ext>
+    </p:extLst>
+  </p:cSld>
+  <p:clrMapOvr>
+    <a:masterClrMapping/>
+  </p:clrMapOvr>
+  <p:transition spd="slow">
+    <p:wipe dir="d"/>
+  </p:transition>
+</p:sld>
+</file>
+
+<file path=ppt/slides/slide7.xml><?xml version="1.0" encoding="utf-8"?>
+<p:sld xmlns:a="http://schemas.openxmlformats.org/drawingml/2006/main" xmlns:r="http://schemas.openxmlformats.org/officeDocument/2006/relationships" xmlns:p="http://schemas.openxmlformats.org/presentationml/2006/main">
+  <p:cSld>
+    <p:spTree>
+      <p:nvGrpSpPr>
+        <p:cNvPr id="1" name=""/>
+        <p:cNvGrpSpPr/>
+        <p:nvPr/>
+      </p:nvGrpSpPr>
+      <p:grpSpPr>
+        <a:xfrm>
+          <a:off x="0" y="0"/>
+          <a:ext cx="0" cy="0"/>
+          <a:chOff x="0" y="0"/>
+          <a:chExt cx="0" cy="0"/>
+        </a:xfrm>
+      </p:grpSpPr>
+      <p:sp>
+        <p:nvSpPr>
           <p:cNvPr id="2" name="Title 1"/>
           <p:cNvSpPr>
             <a:spLocks noGrp="1"/>
@@ -7186,7 +9930,7 @@
 </p:sld>
 </file>
 
-<file path=ppt/slides/slide6.xml><?xml version="1.0" encoding="utf-8"?>
+<file path=ppt/slides/slide8.xml><?xml version="1.0" encoding="utf-8"?>
 <p:sld xmlns:a="http://schemas.openxmlformats.org/drawingml/2006/main" xmlns:r="http://schemas.openxmlformats.org/officeDocument/2006/relationships" xmlns:p="http://schemas.openxmlformats.org/presentationml/2006/main">
   <p:cSld>
     <p:spTree>
@@ -7424,7 +10168,7 @@
 <file path=ppt/theme/theme1.xml><?xml version="1.0" encoding="utf-8"?>
 <a:theme xmlns:a="http://schemas.openxmlformats.org/drawingml/2006/main" name="Retrospect">
   <a:themeElements>
-    <a:clrScheme name="Retrospect">
+    <a:clrScheme name="Custom 1">
       <a:dk1>
         <a:sysClr val="windowText" lastClr="000000"/>
       </a:dk1>
@@ -7456,7 +10200,7 @@
         <a:srgbClr val="62A39F"/>
       </a:accent6>
       <a:hlink>
-        <a:srgbClr val="6EAC1C"/>
+        <a:srgbClr val="002060"/>
       </a:hlink>
       <a:folHlink>
         <a:srgbClr val="B26B02"/>

</xml_diff>